<commit_message>
slides presentation for spatial transportation finished
</commit_message>
<xml_diff>
--- a/presentations/1/slides_presentation.pptx
+++ b/presentations/1/slides_presentation.pptx
@@ -4500,6 +4500,13 @@
   <p:clrMapOvr>
     <a:masterClrMapping/>
   </p:clrMapOvr>
+  <p:timing>
+    <p:tnLst>
+      <p:par>
+        <p:cTn id="1" dur="indefinite" restart="never" nodeType="tmRoot"/>
+      </p:par>
+    </p:tnLst>
+  </p:timing>
 </p:sld>
 </file>
 
@@ -4750,7 +4757,7 @@
           <a:lstStyle/>
           <a:p>
             <a:r>
-              <a:rPr lang="en-US" smtClean="0"/>
+              <a:rPr lang="en-US" dirty="0" smtClean="0"/>
               <a:t>Introduction</a:t>
             </a:r>
             <a:endParaRPr lang="en-US" dirty="0"/>
@@ -4812,6 +4819,50 @@
               </a:rPr>
               <a:t> The first step for defining the position is defining a coordination system</a:t>
             </a:r>
+          </a:p>
+          <a:p>
+            <a:pPr>
+              <a:buFont typeface="Arial" panose="020B0604020202020204" pitchFamily="34" charset="0"/>
+              <a:buChar char="•"/>
+            </a:pPr>
+            <a:r>
+              <a:rPr lang="en-US" dirty="0">
+                <a:solidFill>
+                  <a:schemeClr val="tx1"/>
+                </a:solidFill>
+              </a:rPr>
+              <a:t> </a:t>
+            </a:r>
+            <a:r>
+              <a:rPr lang="en-US" dirty="0" smtClean="0">
+                <a:solidFill>
+                  <a:schemeClr val="tx1"/>
+                </a:solidFill>
+              </a:rPr>
+              <a:t>We describe the position of a point in our coordination system with a position vector</a:t>
+            </a:r>
+          </a:p>
+          <a:p>
+            <a:pPr>
+              <a:buFont typeface="Arial" panose="020B0604020202020204" pitchFamily="34" charset="0"/>
+              <a:buChar char="•"/>
+            </a:pPr>
+            <a:r>
+              <a:rPr lang="en-US" dirty="0">
+                <a:solidFill>
+                  <a:schemeClr val="tx1"/>
+                </a:solidFill>
+              </a:rPr>
+              <a:t> </a:t>
+            </a:r>
+            <a:r>
+              <a:rPr lang="en-US" dirty="0" smtClean="0">
+                <a:solidFill>
+                  <a:schemeClr val="tx1"/>
+                </a:solidFill>
+              </a:rPr>
+              <a:t>We also need the orientation of the points in space and for this we attach a coordinate system to that point</a:t>
+            </a:r>
             <a:endParaRPr lang="en-US" dirty="0">
               <a:solidFill>
                 <a:schemeClr val="tx1"/>
@@ -4843,6 +4894,54 @@
           </a:p>
         </p:txBody>
       </p:sp>
+      <p:pic>
+        <p:nvPicPr>
+          <p:cNvPr id="5" name="Picture 4"/>
+          <p:cNvPicPr>
+            <a:picLocks noChangeAspect="1"/>
+          </p:cNvPicPr>
+          <p:nvPr/>
+        </p:nvPicPr>
+        <p:blipFill>
+          <a:blip r:embed="rId2"/>
+          <a:stretch>
+            <a:fillRect/>
+          </a:stretch>
+        </p:blipFill>
+        <p:spPr>
+          <a:xfrm>
+            <a:off x="8386244" y="4258356"/>
+            <a:ext cx="2033663" cy="2042797"/>
+          </a:xfrm>
+          <a:prstGeom prst="rect">
+            <a:avLst/>
+          </a:prstGeom>
+        </p:spPr>
+      </p:pic>
+      <p:pic>
+        <p:nvPicPr>
+          <p:cNvPr id="6" name="Picture 5"/>
+          <p:cNvPicPr>
+            <a:picLocks noChangeAspect="1"/>
+          </p:cNvPicPr>
+          <p:nvPr/>
+        </p:nvPicPr>
+        <p:blipFill>
+          <a:blip r:embed="rId3"/>
+          <a:stretch>
+            <a:fillRect/>
+          </a:stretch>
+        </p:blipFill>
+        <p:spPr>
+          <a:xfrm>
+            <a:off x="4031194" y="4530269"/>
+            <a:ext cx="2896235" cy="1498969"/>
+          </a:xfrm>
+          <a:prstGeom prst="rect">
+            <a:avLst/>
+          </a:prstGeom>
+        </p:spPr>
+      </p:pic>
     </p:spTree>
     <p:extLst>
       <p:ext uri="{BB962C8B-B14F-4D97-AF65-F5344CB8AC3E}">
@@ -4853,6 +4952,13 @@
   <p:clrMapOvr>
     <a:masterClrMapping/>
   </p:clrMapOvr>
+  <p:timing>
+    <p:tnLst>
+      <p:par>
+        <p:cTn id="1" dur="indefinite" restart="never" nodeType="tmRoot"/>
+      </p:par>
+    </p:tnLst>
+  </p:timing>
 </p:sld>
 </file>
 
@@ -4888,6 +4994,10 @@
           <a:bodyPr/>
           <a:lstStyle/>
           <a:p>
+            <a:r>
+              <a:rPr lang="en-US" dirty="0" smtClean="0"/>
+              <a:t>Orientation</a:t>
+            </a:r>
             <a:endParaRPr lang="en-US" dirty="0"/>
           </a:p>
         </p:txBody>
@@ -4917,7 +5027,65 @@
                   <a:schemeClr val="tx1"/>
                 </a:solidFill>
               </a:rPr>
-              <a:t> V</a:t>
+              <a:t> Orientation defines the relationship between the body “B” frame and the reference frame “A” using a rotation matrix as below</a:t>
+            </a:r>
+          </a:p>
+          <a:p>
+            <a:pPr>
+              <a:buFont typeface="Arial" panose="020B0604020202020204" pitchFamily="34" charset="0"/>
+              <a:buChar char="•"/>
+            </a:pPr>
+            <a:endParaRPr lang="en-US" dirty="0">
+              <a:solidFill>
+                <a:schemeClr val="tx1"/>
+              </a:solidFill>
+            </a:endParaRPr>
+          </a:p>
+          <a:p>
+            <a:pPr>
+              <a:buFont typeface="Arial" panose="020B0604020202020204" pitchFamily="34" charset="0"/>
+              <a:buChar char="•"/>
+            </a:pPr>
+            <a:endParaRPr lang="en-US" dirty="0" smtClean="0">
+              <a:solidFill>
+                <a:schemeClr val="tx1"/>
+              </a:solidFill>
+            </a:endParaRPr>
+          </a:p>
+          <a:p>
+            <a:pPr>
+              <a:buFont typeface="Arial" panose="020B0604020202020204" pitchFamily="34" charset="0"/>
+              <a:buChar char="•"/>
+            </a:pPr>
+            <a:endParaRPr lang="en-US" dirty="0">
+              <a:solidFill>
+                <a:schemeClr val="tx1"/>
+              </a:solidFill>
+            </a:endParaRPr>
+          </a:p>
+          <a:p>
+            <a:pPr>
+              <a:buFont typeface="Arial" panose="020B0604020202020204" pitchFamily="34" charset="0"/>
+              <a:buChar char="•"/>
+            </a:pPr>
+            <a:endParaRPr lang="en-US" dirty="0" smtClean="0">
+              <a:solidFill>
+                <a:schemeClr val="tx1"/>
+              </a:solidFill>
+            </a:endParaRPr>
+          </a:p>
+          <a:p>
+            <a:pPr>
+              <a:buFont typeface="Arial" panose="020B0604020202020204" pitchFamily="34" charset="0"/>
+              <a:buChar char="•"/>
+            </a:pPr>
+            <a:r>
+              <a:rPr lang="en-US" dirty="0" smtClean="0">
+                <a:solidFill>
+                  <a:schemeClr val="tx1"/>
+                </a:solidFill>
+              </a:rPr>
+              <a:t> Therefore for describing the position of the body “B” we just need the position of the origin of frame “B” relative to “A” and the rotation matrix</a:t>
             </a:r>
             <a:endParaRPr lang="en-US" dirty="0">
               <a:solidFill>
@@ -4950,6 +5118,30 @@
           </a:p>
         </p:txBody>
       </p:sp>
+      <p:pic>
+        <p:nvPicPr>
+          <p:cNvPr id="5" name="Picture 4"/>
+          <p:cNvPicPr>
+            <a:picLocks noChangeAspect="1"/>
+          </p:cNvPicPr>
+          <p:nvPr/>
+        </p:nvPicPr>
+        <p:blipFill>
+          <a:blip r:embed="rId2"/>
+          <a:stretch>
+            <a:fillRect/>
+          </a:stretch>
+        </p:blipFill>
+        <p:spPr>
+          <a:xfrm>
+            <a:off x="5456520" y="2348395"/>
+            <a:ext cx="3150290" cy="1778438"/>
+          </a:xfrm>
+          <a:prstGeom prst="rect">
+            <a:avLst/>
+          </a:prstGeom>
+        </p:spPr>
+      </p:pic>
     </p:spTree>
     <p:extLst>
       <p:ext uri="{BB962C8B-B14F-4D97-AF65-F5344CB8AC3E}">
@@ -4960,6 +5152,13 @@
   <p:clrMapOvr>
     <a:masterClrMapping/>
   </p:clrMapOvr>
+  <p:timing>
+    <p:tnLst>
+      <p:par>
+        <p:cTn id="1" dur="indefinite" restart="never" nodeType="tmRoot"/>
+      </p:par>
+    </p:tnLst>
+  </p:timing>
 </p:sld>
 </file>
 
@@ -4995,45 +5194,1461 @@
           <a:bodyPr/>
           <a:lstStyle/>
           <a:p>
+            <a:r>
+              <a:rPr lang="en-US" dirty="0" smtClean="0"/>
+              <a:t>Mapping</a:t>
+            </a:r>
             <a:endParaRPr lang="en-US" dirty="0"/>
           </a:p>
         </p:txBody>
       </p:sp>
-      <p:sp>
-        <p:nvSpPr>
-          <p:cNvPr id="3" name="Content Placeholder 2"/>
-          <p:cNvSpPr>
-            <a:spLocks noGrp="1"/>
-          </p:cNvSpPr>
-          <p:nvPr>
-            <p:ph idx="1"/>
-          </p:nvPr>
-        </p:nvSpPr>
-        <p:spPr/>
-        <p:txBody>
-          <a:bodyPr/>
-          <a:lstStyle/>
-          <a:p>
-            <a:pPr>
-              <a:buFont typeface="Arial" panose="020B0604020202020204" pitchFamily="34" charset="0"/>
-              <a:buChar char="•"/>
-            </a:pPr>
-            <a:r>
-              <a:rPr lang="en-US" dirty="0" smtClean="0">
-                <a:solidFill>
-                  <a:schemeClr val="tx1"/>
-                </a:solidFill>
-              </a:rPr>
-              <a:t> V</a:t>
-            </a:r>
-            <a:endParaRPr lang="en-US" dirty="0">
-              <a:solidFill>
-                <a:schemeClr val="tx1"/>
-              </a:solidFill>
-            </a:endParaRPr>
-          </a:p>
-        </p:txBody>
-      </p:sp>
+      <mc:AlternateContent xmlns:mc="http://schemas.openxmlformats.org/markup-compatibility/2006">
+        <mc:Choice xmlns:a14="http://schemas.microsoft.com/office/drawing/2010/main" Requires="a14">
+          <p:sp>
+            <p:nvSpPr>
+              <p:cNvPr id="3" name="Content Placeholder 2"/>
+              <p:cNvSpPr>
+                <a:spLocks noGrp="1"/>
+              </p:cNvSpPr>
+              <p:nvPr>
+                <p:ph idx="1"/>
+              </p:nvPr>
+            </p:nvSpPr>
+            <p:spPr>
+              <a:xfrm>
+                <a:off x="1097279" y="1845734"/>
+                <a:ext cx="10721681" cy="4023360"/>
+              </a:xfrm>
+            </p:spPr>
+            <p:txBody>
+              <a:bodyPr/>
+              <a:lstStyle/>
+              <a:p>
+                <a:pPr>
+                  <a:buFont typeface="Arial" panose="020B0604020202020204" pitchFamily="34" charset="0"/>
+                  <a:buChar char="•"/>
+                </a:pPr>
+                <a:r>
+                  <a:rPr lang="en-US" dirty="0" smtClean="0">
+                    <a:solidFill>
+                      <a:schemeClr val="tx1"/>
+                    </a:solidFill>
+                  </a:rPr>
+                  <a:t> Mapping can be described as the changing description from frame to frame</a:t>
+                </a:r>
+              </a:p>
+              <a:p>
+                <a:pPr>
+                  <a:buFont typeface="Arial" panose="020B0604020202020204" pitchFamily="34" charset="0"/>
+                  <a:buChar char="•"/>
+                </a:pPr>
+                <a:r>
+                  <a:rPr lang="en-US" dirty="0">
+                    <a:solidFill>
+                      <a:schemeClr val="tx1"/>
+                    </a:solidFill>
+                  </a:rPr>
+                  <a:t> </a:t>
+                </a:r>
+                <a:r>
+                  <a:rPr lang="en-US" dirty="0" smtClean="0">
+                    <a:solidFill>
+                      <a:schemeClr val="tx1"/>
+                    </a:solidFill>
+                  </a:rPr>
+                  <a:t>If we only have translation and not rotation the mapping can be </a:t>
+                </a:r>
+                <a:r>
+                  <a:rPr lang="en-US" dirty="0">
+                    <a:solidFill>
+                      <a:schemeClr val="tx1"/>
+                    </a:solidFill>
+                  </a:rPr>
+                  <a:t>calculated from: </a:t>
+                </a:r>
+                <a14:m>
+                  <m:oMath xmlns:m="http://schemas.openxmlformats.org/officeDocument/2006/math">
+                    <m:sPre>
+                      <m:sPrePr>
+                        <m:ctrlPr>
+                          <a:rPr lang="en-US" i="1">
+                            <a:solidFill>
+                              <a:schemeClr val="tx1"/>
+                            </a:solidFill>
+                            <a:latin typeface="Cambria Math" panose="02040503050406030204" pitchFamily="18" charset="0"/>
+                          </a:rPr>
+                        </m:ctrlPr>
+                      </m:sPrePr>
+                      <m:sub/>
+                      <m:sup>
+                        <m:r>
+                          <a:rPr lang="en-US" i="1">
+                            <a:latin typeface="Cambria Math" panose="02040503050406030204" pitchFamily="18" charset="0"/>
+                          </a:rPr>
+                          <m:t>𝐴</m:t>
+                        </m:r>
+                      </m:sup>
+                      <m:e>
+                        <m:r>
+                          <a:rPr lang="en-US" i="1">
+                            <a:latin typeface="Cambria Math" panose="02040503050406030204" pitchFamily="18" charset="0"/>
+                          </a:rPr>
+                          <m:t>𝑃</m:t>
+                        </m:r>
+                      </m:e>
+                    </m:sPre>
+                    <m:r>
+                      <a:rPr lang="en-US" i="1">
+                        <a:latin typeface="Cambria Math" panose="02040503050406030204" pitchFamily="18" charset="0"/>
+                      </a:rPr>
+                      <m:t>=</m:t>
+                    </m:r>
+                    <m:sPre>
+                      <m:sPrePr>
+                        <m:ctrlPr>
+                          <a:rPr lang="en-US" i="1">
+                            <a:solidFill>
+                              <a:schemeClr val="tx1"/>
+                            </a:solidFill>
+                            <a:latin typeface="Cambria Math" panose="02040503050406030204" pitchFamily="18" charset="0"/>
+                          </a:rPr>
+                        </m:ctrlPr>
+                      </m:sPrePr>
+                      <m:sub/>
+                      <m:sup>
+                        <m:r>
+                          <a:rPr lang="en-US" i="1">
+                            <a:solidFill>
+                              <a:schemeClr val="tx1"/>
+                            </a:solidFill>
+                            <a:latin typeface="Cambria Math" panose="02040503050406030204" pitchFamily="18" charset="0"/>
+                          </a:rPr>
+                          <m:t>𝐵</m:t>
+                        </m:r>
+                      </m:sup>
+                      <m:e>
+                        <m:r>
+                          <a:rPr lang="en-US" i="1">
+                            <a:solidFill>
+                              <a:schemeClr val="tx1"/>
+                            </a:solidFill>
+                            <a:latin typeface="Cambria Math" panose="02040503050406030204" pitchFamily="18" charset="0"/>
+                          </a:rPr>
+                          <m:t>𝑃</m:t>
+                        </m:r>
+                      </m:e>
+                    </m:sPre>
+                    <m:r>
+                      <a:rPr lang="en-US" i="1">
+                        <a:solidFill>
+                          <a:schemeClr val="tx1"/>
+                        </a:solidFill>
+                        <a:latin typeface="Cambria Math" panose="02040503050406030204" pitchFamily="18" charset="0"/>
+                      </a:rPr>
+                      <m:t>+</m:t>
+                    </m:r>
+                    <m:sPre>
+                      <m:sPrePr>
+                        <m:ctrlPr>
+                          <a:rPr lang="en-US" i="1">
+                            <a:solidFill>
+                              <a:schemeClr val="tx1"/>
+                            </a:solidFill>
+                            <a:latin typeface="Cambria Math" panose="02040503050406030204" pitchFamily="18" charset="0"/>
+                          </a:rPr>
+                        </m:ctrlPr>
+                      </m:sPrePr>
+                      <m:sub/>
+                      <m:sup>
+                        <m:r>
+                          <a:rPr lang="en-US" i="1">
+                            <a:solidFill>
+                              <a:schemeClr val="tx1"/>
+                            </a:solidFill>
+                            <a:latin typeface="Cambria Math" panose="02040503050406030204" pitchFamily="18" charset="0"/>
+                          </a:rPr>
+                          <m:t>𝐴</m:t>
+                        </m:r>
+                      </m:sup>
+                      <m:e>
+                        <m:r>
+                          <a:rPr lang="en-US" i="1">
+                            <a:solidFill>
+                              <a:schemeClr val="tx1"/>
+                            </a:solidFill>
+                            <a:latin typeface="Cambria Math" panose="02040503050406030204" pitchFamily="18" charset="0"/>
+                          </a:rPr>
+                          <m:t>𝑃</m:t>
+                        </m:r>
+                      </m:e>
+                    </m:sPre>
+                    <m:r>
+                      <a:rPr lang="en-US" i="1" baseline="-25000">
+                        <a:solidFill>
+                          <a:schemeClr val="tx1"/>
+                        </a:solidFill>
+                        <a:latin typeface="Cambria Math" panose="02040503050406030204" pitchFamily="18" charset="0"/>
+                      </a:rPr>
+                      <m:t>𝐵𝑂𝑅𝐺</m:t>
+                    </m:r>
+                  </m:oMath>
+                </a14:m>
+                <a:endParaRPr lang="en-US" dirty="0" smtClean="0">
+                  <a:solidFill>
+                    <a:schemeClr val="tx1"/>
+                  </a:solidFill>
+                </a:endParaRPr>
+              </a:p>
+              <a:p>
+                <a:pPr>
+                  <a:buFont typeface="Arial" panose="020B0604020202020204" pitchFamily="34" charset="0"/>
+                  <a:buChar char="•"/>
+                </a:pPr>
+                <a:r>
+                  <a:rPr lang="en-US" dirty="0" smtClean="0">
+                    <a:solidFill>
+                      <a:schemeClr val="tx1"/>
+                    </a:solidFill>
+                  </a:rPr>
+                  <a:t> </a:t>
+                </a:r>
+                <a:r>
+                  <a:rPr lang="en-US" dirty="0">
+                    <a:solidFill>
+                      <a:schemeClr val="tx1"/>
+                    </a:solidFill>
+                  </a:rPr>
+                  <a:t>If we only have translation and not rotation the mapping can be </a:t>
+                </a:r>
+                <a:r>
+                  <a:rPr lang="en-US" dirty="0">
+                    <a:solidFill>
+                      <a:schemeClr val="tx1"/>
+                    </a:solidFill>
+                  </a:rPr>
+                  <a:t>calculated from: </a:t>
+                </a:r>
+                <a14:m>
+                  <m:oMath xmlns:m="http://schemas.openxmlformats.org/officeDocument/2006/math">
+                    <m:sPre>
+                      <m:sPrePr>
+                        <m:ctrlPr>
+                          <a:rPr lang="en-US" i="1">
+                            <a:solidFill>
+                              <a:schemeClr val="tx1"/>
+                            </a:solidFill>
+                            <a:latin typeface="Cambria Math" panose="02040503050406030204" pitchFamily="18" charset="0"/>
+                          </a:rPr>
+                        </m:ctrlPr>
+                      </m:sPrePr>
+                      <m:sub/>
+                      <m:sup>
+                        <m:r>
+                          <a:rPr lang="en-US" i="1">
+                            <a:latin typeface="Cambria Math" panose="02040503050406030204" pitchFamily="18" charset="0"/>
+                          </a:rPr>
+                          <m:t>𝐴</m:t>
+                        </m:r>
+                      </m:sup>
+                      <m:e>
+                        <m:r>
+                          <a:rPr lang="en-US" i="1">
+                            <a:latin typeface="Cambria Math" panose="02040503050406030204" pitchFamily="18" charset="0"/>
+                          </a:rPr>
+                          <m:t>𝑃</m:t>
+                        </m:r>
+                      </m:e>
+                    </m:sPre>
+                    <m:r>
+                      <a:rPr lang="en-US" i="1">
+                        <a:latin typeface="Cambria Math" panose="02040503050406030204" pitchFamily="18" charset="0"/>
+                      </a:rPr>
+                      <m:t>=</m:t>
+                    </m:r>
+                    <m:sPre>
+                      <m:sPrePr>
+                        <m:ctrlPr>
+                          <a:rPr lang="en-US" i="1">
+                            <a:solidFill>
+                              <a:schemeClr val="tx1"/>
+                            </a:solidFill>
+                            <a:latin typeface="Cambria Math" panose="02040503050406030204" pitchFamily="18" charset="0"/>
+                          </a:rPr>
+                        </m:ctrlPr>
+                      </m:sPrePr>
+                      <m:sub>
+                        <m:r>
+                          <a:rPr lang="en-US" b="0" i="1" smtClean="0">
+                            <a:solidFill>
+                              <a:schemeClr val="tx1"/>
+                            </a:solidFill>
+                            <a:latin typeface="Cambria Math" panose="02040503050406030204" pitchFamily="18" charset="0"/>
+                          </a:rPr>
+                          <m:t>𝐵</m:t>
+                        </m:r>
+                      </m:sub>
+                      <m:sup>
+                        <m:r>
+                          <a:rPr lang="en-US" b="0" i="1" smtClean="0">
+                            <a:solidFill>
+                              <a:schemeClr val="tx1"/>
+                            </a:solidFill>
+                            <a:latin typeface="Cambria Math" panose="02040503050406030204" pitchFamily="18" charset="0"/>
+                          </a:rPr>
+                          <m:t>𝐴</m:t>
+                        </m:r>
+                      </m:sup>
+                      <m:e>
+                        <m:r>
+                          <a:rPr lang="en-US" b="0" i="1" smtClean="0">
+                            <a:solidFill>
+                              <a:schemeClr val="tx1"/>
+                            </a:solidFill>
+                            <a:latin typeface="Cambria Math" panose="02040503050406030204" pitchFamily="18" charset="0"/>
+                          </a:rPr>
+                          <m:t>𝑅</m:t>
+                        </m:r>
+                      </m:e>
+                    </m:sPre>
+                    <m:sPre>
+                      <m:sPrePr>
+                        <m:ctrlPr>
+                          <a:rPr lang="en-US" i="1">
+                            <a:solidFill>
+                              <a:schemeClr val="tx1"/>
+                            </a:solidFill>
+                            <a:latin typeface="Cambria Math" panose="02040503050406030204" pitchFamily="18" charset="0"/>
+                          </a:rPr>
+                        </m:ctrlPr>
+                      </m:sPrePr>
+                      <m:sub/>
+                      <m:sup>
+                        <m:r>
+                          <a:rPr lang="en-US" b="0" i="1" smtClean="0">
+                            <a:solidFill>
+                              <a:schemeClr val="tx1"/>
+                            </a:solidFill>
+                            <a:latin typeface="Cambria Math" panose="02040503050406030204" pitchFamily="18" charset="0"/>
+                          </a:rPr>
+                          <m:t>𝐵</m:t>
+                        </m:r>
+                      </m:sup>
+                      <m:e>
+                        <m:r>
+                          <a:rPr lang="en-US" i="1">
+                            <a:solidFill>
+                              <a:schemeClr val="tx1"/>
+                            </a:solidFill>
+                            <a:latin typeface="Cambria Math" panose="02040503050406030204" pitchFamily="18" charset="0"/>
+                          </a:rPr>
+                          <m:t>𝑃</m:t>
+                        </m:r>
+                      </m:e>
+                    </m:sPre>
+                  </m:oMath>
+                </a14:m>
+                <a:endParaRPr lang="en-US" dirty="0">
+                  <a:solidFill>
+                    <a:schemeClr val="tx1"/>
+                  </a:solidFill>
+                </a:endParaRPr>
+              </a:p>
+              <a:p>
+                <a:pPr>
+                  <a:buFont typeface="Arial" panose="020B0604020202020204" pitchFamily="34" charset="0"/>
+                  <a:buChar char="•"/>
+                </a:pPr>
+                <a:r>
+                  <a:rPr lang="en-US" dirty="0" smtClean="0">
+                    <a:solidFill>
+                      <a:schemeClr val="tx1"/>
+                    </a:solidFill>
+                  </a:rPr>
+                  <a:t> It must be noted that the rotation matrix is orthogonal and therefore </a:t>
+                </a:r>
+                <a:r>
+                  <a:rPr lang="en-US" dirty="0">
+                    <a:solidFill>
+                      <a:schemeClr val="tx1"/>
+                    </a:solidFill>
+                  </a:rPr>
+                  <a:t>we have: </a:t>
+                </a:r>
+                <a14:m>
+                  <m:oMath xmlns:m="http://schemas.openxmlformats.org/officeDocument/2006/math">
+                    <m:sPre>
+                      <m:sPrePr>
+                        <m:ctrlPr>
+                          <a:rPr lang="en-US" i="1">
+                            <a:solidFill>
+                              <a:schemeClr val="tx1"/>
+                            </a:solidFill>
+                            <a:latin typeface="Cambria Math" panose="02040503050406030204" pitchFamily="18" charset="0"/>
+                          </a:rPr>
+                        </m:ctrlPr>
+                      </m:sPrePr>
+                      <m:sub>
+                        <m:r>
+                          <a:rPr lang="en-US" i="1">
+                            <a:solidFill>
+                              <a:schemeClr val="tx1"/>
+                            </a:solidFill>
+                            <a:latin typeface="Cambria Math" panose="02040503050406030204" pitchFamily="18" charset="0"/>
+                          </a:rPr>
+                          <m:t>𝐵</m:t>
+                        </m:r>
+                      </m:sub>
+                      <m:sup>
+                        <m:r>
+                          <a:rPr lang="en-US" i="1">
+                            <a:latin typeface="Cambria Math" panose="02040503050406030204" pitchFamily="18" charset="0"/>
+                          </a:rPr>
+                          <m:t>𝐴</m:t>
+                        </m:r>
+                      </m:sup>
+                      <m:e>
+                        <m:r>
+                          <a:rPr lang="en-US" i="1">
+                            <a:latin typeface="Cambria Math" panose="02040503050406030204" pitchFamily="18" charset="0"/>
+                          </a:rPr>
+                          <m:t>𝑅</m:t>
+                        </m:r>
+                      </m:e>
+                    </m:sPre>
+                    <m:r>
+                      <a:rPr lang="en-US" i="1">
+                        <a:latin typeface="Cambria Math" panose="02040503050406030204" pitchFamily="18" charset="0"/>
+                      </a:rPr>
+                      <m:t>=</m:t>
+                    </m:r>
+                    <m:sPre>
+                      <m:sPrePr>
+                        <m:ctrlPr>
+                          <a:rPr lang="en-US" i="1">
+                            <a:solidFill>
+                              <a:schemeClr val="tx1"/>
+                            </a:solidFill>
+                            <a:latin typeface="Cambria Math" panose="02040503050406030204" pitchFamily="18" charset="0"/>
+                          </a:rPr>
+                        </m:ctrlPr>
+                      </m:sPrePr>
+                      <m:sub>
+                        <m:r>
+                          <a:rPr lang="en-US" i="1">
+                            <a:solidFill>
+                              <a:schemeClr val="tx1"/>
+                            </a:solidFill>
+                            <a:latin typeface="Cambria Math" panose="02040503050406030204" pitchFamily="18" charset="0"/>
+                          </a:rPr>
+                          <m:t>𝐴</m:t>
+                        </m:r>
+                      </m:sub>
+                      <m:sup>
+                        <m:r>
+                          <a:rPr lang="en-US" i="1">
+                            <a:solidFill>
+                              <a:schemeClr val="tx1"/>
+                            </a:solidFill>
+                            <a:latin typeface="Cambria Math" panose="02040503050406030204" pitchFamily="18" charset="0"/>
+                          </a:rPr>
+                          <m:t>𝐵</m:t>
+                        </m:r>
+                      </m:sup>
+                      <m:e>
+                        <m:sSup>
+                          <m:sSupPr>
+                            <m:ctrlPr>
+                              <a:rPr lang="en-US" i="1">
+                                <a:solidFill>
+                                  <a:schemeClr val="tx1"/>
+                                </a:solidFill>
+                                <a:latin typeface="Cambria Math" panose="02040503050406030204" pitchFamily="18" charset="0"/>
+                              </a:rPr>
+                            </m:ctrlPr>
+                          </m:sSupPr>
+                          <m:e>
+                            <m:r>
+                              <a:rPr lang="en-US" i="1">
+                                <a:solidFill>
+                                  <a:schemeClr val="tx1"/>
+                                </a:solidFill>
+                                <a:latin typeface="Cambria Math" panose="02040503050406030204" pitchFamily="18" charset="0"/>
+                              </a:rPr>
+                              <m:t>𝑅</m:t>
+                            </m:r>
+                          </m:e>
+                          <m:sup>
+                            <m:r>
+                              <a:rPr lang="en-US" i="1">
+                                <a:solidFill>
+                                  <a:schemeClr val="tx1"/>
+                                </a:solidFill>
+                                <a:latin typeface="Cambria Math" panose="02040503050406030204" pitchFamily="18" charset="0"/>
+                              </a:rPr>
+                              <m:t>−1</m:t>
+                            </m:r>
+                          </m:sup>
+                        </m:sSup>
+                      </m:e>
+                    </m:sPre>
+                    <m:r>
+                      <a:rPr lang="en-US" i="1">
+                        <a:solidFill>
+                          <a:schemeClr val="tx1"/>
+                        </a:solidFill>
+                        <a:latin typeface="Cambria Math" panose="02040503050406030204" pitchFamily="18" charset="0"/>
+                      </a:rPr>
+                      <m:t>=</m:t>
+                    </m:r>
+                    <m:sPre>
+                      <m:sPrePr>
+                        <m:ctrlPr>
+                          <a:rPr lang="en-US" i="1">
+                            <a:solidFill>
+                              <a:schemeClr val="tx1"/>
+                            </a:solidFill>
+                            <a:latin typeface="Cambria Math" panose="02040503050406030204" pitchFamily="18" charset="0"/>
+                          </a:rPr>
+                        </m:ctrlPr>
+                      </m:sPrePr>
+                      <m:sub>
+                        <m:r>
+                          <a:rPr lang="en-US" i="1">
+                            <a:solidFill>
+                              <a:schemeClr val="tx1"/>
+                            </a:solidFill>
+                            <a:latin typeface="Cambria Math" panose="02040503050406030204" pitchFamily="18" charset="0"/>
+                          </a:rPr>
+                          <m:t>𝐴</m:t>
+                        </m:r>
+                      </m:sub>
+                      <m:sup>
+                        <m:r>
+                          <a:rPr lang="en-US" i="1">
+                            <a:solidFill>
+                              <a:schemeClr val="tx1"/>
+                            </a:solidFill>
+                            <a:latin typeface="Cambria Math" panose="02040503050406030204" pitchFamily="18" charset="0"/>
+                          </a:rPr>
+                          <m:t>𝐵</m:t>
+                        </m:r>
+                      </m:sup>
+                      <m:e>
+                        <m:sSup>
+                          <m:sSupPr>
+                            <m:ctrlPr>
+                              <a:rPr lang="en-US" i="1">
+                                <a:solidFill>
+                                  <a:schemeClr val="tx1"/>
+                                </a:solidFill>
+                                <a:latin typeface="Cambria Math" panose="02040503050406030204" pitchFamily="18" charset="0"/>
+                              </a:rPr>
+                            </m:ctrlPr>
+                          </m:sSupPr>
+                          <m:e>
+                            <m:r>
+                              <a:rPr lang="en-US" i="1">
+                                <a:solidFill>
+                                  <a:schemeClr val="tx1"/>
+                                </a:solidFill>
+                                <a:latin typeface="Cambria Math" panose="02040503050406030204" pitchFamily="18" charset="0"/>
+                              </a:rPr>
+                              <m:t>𝑅</m:t>
+                            </m:r>
+                          </m:e>
+                          <m:sup>
+                            <m:r>
+                              <a:rPr lang="en-US" i="1">
+                                <a:solidFill>
+                                  <a:schemeClr val="tx1"/>
+                                </a:solidFill>
+                                <a:latin typeface="Cambria Math" panose="02040503050406030204" pitchFamily="18" charset="0"/>
+                              </a:rPr>
+                              <m:t>𝑇</m:t>
+                            </m:r>
+                          </m:sup>
+                        </m:sSup>
+                      </m:e>
+                    </m:sPre>
+                  </m:oMath>
+                </a14:m>
+                <a:endParaRPr lang="en-US" dirty="0" smtClean="0">
+                  <a:solidFill>
+                    <a:schemeClr val="tx1"/>
+                  </a:solidFill>
+                </a:endParaRPr>
+              </a:p>
+              <a:p>
+                <a:pPr>
+                  <a:buFont typeface="Arial" panose="020B0604020202020204" pitchFamily="34" charset="0"/>
+                  <a:buChar char="•"/>
+                </a:pPr>
+                <a:r>
+                  <a:rPr lang="en-US" dirty="0">
+                    <a:solidFill>
+                      <a:schemeClr val="tx1"/>
+                    </a:solidFill>
+                  </a:rPr>
+                  <a:t> </a:t>
+                </a:r>
+                <a:r>
+                  <a:rPr lang="en-US" dirty="0" smtClean="0">
+                    <a:solidFill>
+                      <a:schemeClr val="tx1"/>
+                    </a:solidFill>
+                  </a:rPr>
+                  <a:t>The rotation matrices with respect to the reference frame are defined as below:</a:t>
+                </a:r>
+                <a:endParaRPr lang="en-US" baseline="-25000" dirty="0">
+                  <a:solidFill>
+                    <a:schemeClr val="tx1"/>
+                  </a:solidFill>
+                </a:endParaRPr>
+              </a:p>
+              <a:p>
+                <a:pPr marL="0" indent="0">
+                  <a:buNone/>
+                </a:pPr>
+                <a14:m>
+                  <m:oMath xmlns:m="http://schemas.openxmlformats.org/officeDocument/2006/math">
+                    <m:sSub>
+                      <m:sSubPr>
+                        <m:ctrlPr>
+                          <a:rPr lang="en-US" b="0" i="1" smtClean="0">
+                            <a:solidFill>
+                              <a:schemeClr val="tx1"/>
+                            </a:solidFill>
+                            <a:latin typeface="Cambria Math" panose="02040503050406030204" pitchFamily="18" charset="0"/>
+                          </a:rPr>
+                        </m:ctrlPr>
+                      </m:sSubPr>
+                      <m:e>
+                        <m:r>
+                          <a:rPr lang="en-US" b="0" i="1" smtClean="0">
+                            <a:solidFill>
+                              <a:schemeClr val="tx1"/>
+                            </a:solidFill>
+                            <a:latin typeface="Cambria Math" panose="02040503050406030204" pitchFamily="18" charset="0"/>
+                          </a:rPr>
+                          <m:t>𝑅</m:t>
+                        </m:r>
+                      </m:e>
+                      <m:sub>
+                        <m:r>
+                          <a:rPr lang="en-US" b="0" i="1" smtClean="0">
+                            <a:solidFill>
+                              <a:schemeClr val="tx1"/>
+                            </a:solidFill>
+                            <a:latin typeface="Cambria Math" panose="02040503050406030204" pitchFamily="18" charset="0"/>
+                          </a:rPr>
+                          <m:t>𝑥</m:t>
+                        </m:r>
+                      </m:sub>
+                    </m:sSub>
+                    <m:d>
+                      <m:dPr>
+                        <m:ctrlPr>
+                          <a:rPr lang="en-US" b="0" i="1" smtClean="0">
+                            <a:solidFill>
+                              <a:schemeClr val="tx1"/>
+                            </a:solidFill>
+                            <a:latin typeface="Cambria Math" panose="02040503050406030204" pitchFamily="18" charset="0"/>
+                          </a:rPr>
+                        </m:ctrlPr>
+                      </m:dPr>
+                      <m:e>
+                        <m:r>
+                          <a:rPr lang="en-US" b="0" i="1" smtClean="0">
+                            <a:solidFill>
+                              <a:schemeClr val="tx1"/>
+                            </a:solidFill>
+                            <a:latin typeface="Cambria Math" panose="02040503050406030204" pitchFamily="18" charset="0"/>
+                          </a:rPr>
+                          <m:t>𝛾</m:t>
+                        </m:r>
+                      </m:e>
+                    </m:d>
+                    <m:r>
+                      <a:rPr lang="en-US" i="1" smtClean="0">
+                        <a:solidFill>
+                          <a:schemeClr val="tx1"/>
+                        </a:solidFill>
+                        <a:latin typeface="Cambria Math" panose="02040503050406030204" pitchFamily="18" charset="0"/>
+                      </a:rPr>
+                      <m:t>=</m:t>
+                    </m:r>
+                    <m:d>
+                      <m:dPr>
+                        <m:begChr m:val="["/>
+                        <m:endChr m:val="]"/>
+                        <m:ctrlPr>
+                          <a:rPr lang="en-US" b="0" i="1" smtClean="0">
+                            <a:solidFill>
+                              <a:schemeClr val="tx1"/>
+                            </a:solidFill>
+                            <a:latin typeface="Cambria Math" panose="02040503050406030204" pitchFamily="18" charset="0"/>
+                          </a:rPr>
+                        </m:ctrlPr>
+                      </m:dPr>
+                      <m:e>
+                        <m:m>
+                          <m:mPr>
+                            <m:mcs>
+                              <m:mc>
+                                <m:mcPr>
+                                  <m:count m:val="3"/>
+                                  <m:mcJc m:val="center"/>
+                                </m:mcPr>
+                              </m:mc>
+                            </m:mcs>
+                            <m:ctrlPr>
+                              <a:rPr lang="en-US" b="0" i="1" smtClean="0">
+                                <a:solidFill>
+                                  <a:schemeClr val="tx1"/>
+                                </a:solidFill>
+                                <a:latin typeface="Cambria Math" panose="02040503050406030204" pitchFamily="18" charset="0"/>
+                              </a:rPr>
+                            </m:ctrlPr>
+                          </m:mPr>
+                          <m:mr>
+                            <m:e>
+                              <m:r>
+                                <m:rPr>
+                                  <m:brk m:alnAt="7"/>
+                                </m:rPr>
+                                <a:rPr lang="en-US" b="0" i="1" smtClean="0">
+                                  <a:solidFill>
+                                    <a:schemeClr val="tx1"/>
+                                  </a:solidFill>
+                                  <a:latin typeface="Cambria Math" panose="02040503050406030204" pitchFamily="18" charset="0"/>
+                                </a:rPr>
+                                <m:t>1</m:t>
+                              </m:r>
+                            </m:e>
+                            <m:e>
+                              <m:r>
+                                <a:rPr lang="en-US" b="0" i="1" smtClean="0">
+                                  <a:solidFill>
+                                    <a:schemeClr val="tx1"/>
+                                  </a:solidFill>
+                                  <a:latin typeface="Cambria Math" panose="02040503050406030204" pitchFamily="18" charset="0"/>
+                                </a:rPr>
+                                <m:t>0</m:t>
+                              </m:r>
+                            </m:e>
+                            <m:e>
+                              <m:r>
+                                <a:rPr lang="en-US" b="0" i="1" smtClean="0">
+                                  <a:solidFill>
+                                    <a:schemeClr val="tx1"/>
+                                  </a:solidFill>
+                                  <a:latin typeface="Cambria Math" panose="02040503050406030204" pitchFamily="18" charset="0"/>
+                                </a:rPr>
+                                <m:t>0</m:t>
+                              </m:r>
+                            </m:e>
+                          </m:mr>
+                          <m:mr>
+                            <m:e>
+                              <m:r>
+                                <a:rPr lang="en-US" b="0" i="1" smtClean="0">
+                                  <a:solidFill>
+                                    <a:schemeClr val="tx1"/>
+                                  </a:solidFill>
+                                  <a:latin typeface="Cambria Math" panose="02040503050406030204" pitchFamily="18" charset="0"/>
+                                </a:rPr>
+                                <m:t>0</m:t>
+                              </m:r>
+                            </m:e>
+                            <m:e>
+                              <m:r>
+                                <a:rPr lang="en-US" b="0" i="1" smtClean="0">
+                                  <a:solidFill>
+                                    <a:schemeClr val="tx1"/>
+                                  </a:solidFill>
+                                  <a:latin typeface="Cambria Math" panose="02040503050406030204" pitchFamily="18" charset="0"/>
+                                </a:rPr>
+                                <m:t>𝑐</m:t>
+                              </m:r>
+                              <m:r>
+                                <a:rPr lang="en-US" b="0" i="1" smtClean="0">
+                                  <a:solidFill>
+                                    <a:schemeClr val="tx1"/>
+                                  </a:solidFill>
+                                  <a:latin typeface="Cambria Math" panose="02040503050406030204" pitchFamily="18" charset="0"/>
+                                </a:rPr>
+                                <m:t>𝛾</m:t>
+                              </m:r>
+                            </m:e>
+                            <m:e>
+                              <m:r>
+                                <a:rPr lang="en-US" b="0" i="1" smtClean="0">
+                                  <a:solidFill>
+                                    <a:schemeClr val="tx1"/>
+                                  </a:solidFill>
+                                  <a:latin typeface="Cambria Math" panose="02040503050406030204" pitchFamily="18" charset="0"/>
+                                </a:rPr>
+                                <m:t>−</m:t>
+                              </m:r>
+                              <m:r>
+                                <a:rPr lang="en-US" b="0" i="1" smtClean="0">
+                                  <a:solidFill>
+                                    <a:schemeClr val="tx1"/>
+                                  </a:solidFill>
+                                  <a:latin typeface="Cambria Math" panose="02040503050406030204" pitchFamily="18" charset="0"/>
+                                </a:rPr>
+                                <m:t>𝑠</m:t>
+                              </m:r>
+                              <m:r>
+                                <a:rPr lang="en-US" b="0" i="1" smtClean="0">
+                                  <a:solidFill>
+                                    <a:schemeClr val="tx1"/>
+                                  </a:solidFill>
+                                  <a:latin typeface="Cambria Math" panose="02040503050406030204" pitchFamily="18" charset="0"/>
+                                </a:rPr>
+                                <m:t>𝛾</m:t>
+                              </m:r>
+                            </m:e>
+                          </m:mr>
+                          <m:mr>
+                            <m:e>
+                              <m:r>
+                                <a:rPr lang="en-US" b="0" i="1" smtClean="0">
+                                  <a:solidFill>
+                                    <a:schemeClr val="tx1"/>
+                                  </a:solidFill>
+                                  <a:latin typeface="Cambria Math" panose="02040503050406030204" pitchFamily="18" charset="0"/>
+                                </a:rPr>
+                                <m:t>0</m:t>
+                              </m:r>
+                            </m:e>
+                            <m:e>
+                              <m:r>
+                                <a:rPr lang="en-US" b="0" i="1" smtClean="0">
+                                  <a:solidFill>
+                                    <a:schemeClr val="tx1"/>
+                                  </a:solidFill>
+                                  <a:latin typeface="Cambria Math" panose="02040503050406030204" pitchFamily="18" charset="0"/>
+                                </a:rPr>
+                                <m:t>𝑠</m:t>
+                              </m:r>
+                              <m:r>
+                                <a:rPr lang="en-US" b="0" i="1" smtClean="0">
+                                  <a:solidFill>
+                                    <a:schemeClr val="tx1"/>
+                                  </a:solidFill>
+                                  <a:latin typeface="Cambria Math" panose="02040503050406030204" pitchFamily="18" charset="0"/>
+                                </a:rPr>
+                                <m:t>𝛾</m:t>
+                              </m:r>
+                            </m:e>
+                            <m:e>
+                              <m:r>
+                                <a:rPr lang="en-US" b="0" i="1" smtClean="0">
+                                  <a:solidFill>
+                                    <a:schemeClr val="tx1"/>
+                                  </a:solidFill>
+                                  <a:latin typeface="Cambria Math" panose="02040503050406030204" pitchFamily="18" charset="0"/>
+                                </a:rPr>
+                                <m:t>𝑐</m:t>
+                              </m:r>
+                              <m:r>
+                                <a:rPr lang="en-US" b="0" i="1" smtClean="0">
+                                  <a:solidFill>
+                                    <a:schemeClr val="tx1"/>
+                                  </a:solidFill>
+                                  <a:latin typeface="Cambria Math" panose="02040503050406030204" pitchFamily="18" charset="0"/>
+                                </a:rPr>
+                                <m:t>𝛾</m:t>
+                              </m:r>
+                            </m:e>
+                          </m:mr>
+                        </m:m>
+                      </m:e>
+                    </m:d>
+                  </m:oMath>
+                </a14:m>
+                <a:r>
+                  <a:rPr lang="en-US" dirty="0" smtClean="0">
+                    <a:solidFill>
+                      <a:schemeClr val="tx1"/>
+                    </a:solidFill>
+                  </a:rPr>
+                  <a:t>    </a:t>
+                </a:r>
+                <a14:m>
+                  <m:oMath xmlns:m="http://schemas.openxmlformats.org/officeDocument/2006/math">
+                    <m:sSub>
+                      <m:sSubPr>
+                        <m:ctrlPr>
+                          <a:rPr lang="en-US" i="1">
+                            <a:solidFill>
+                              <a:schemeClr val="tx1"/>
+                            </a:solidFill>
+                            <a:latin typeface="Cambria Math" panose="02040503050406030204" pitchFamily="18" charset="0"/>
+                          </a:rPr>
+                        </m:ctrlPr>
+                      </m:sSubPr>
+                      <m:e>
+                        <m:r>
+                          <a:rPr lang="en-US" i="1">
+                            <a:solidFill>
+                              <a:schemeClr val="tx1"/>
+                            </a:solidFill>
+                            <a:latin typeface="Cambria Math" panose="02040503050406030204" pitchFamily="18" charset="0"/>
+                          </a:rPr>
+                          <m:t>𝑅</m:t>
+                        </m:r>
+                      </m:e>
+                      <m:sub>
+                        <m:r>
+                          <a:rPr lang="en-US" b="0" i="1" smtClean="0">
+                            <a:solidFill>
+                              <a:schemeClr val="tx1"/>
+                            </a:solidFill>
+                            <a:latin typeface="Cambria Math" panose="02040503050406030204" pitchFamily="18" charset="0"/>
+                          </a:rPr>
+                          <m:t>𝑌</m:t>
+                        </m:r>
+                      </m:sub>
+                    </m:sSub>
+                    <m:d>
+                      <m:dPr>
+                        <m:ctrlPr>
+                          <a:rPr lang="en-US" i="1">
+                            <a:solidFill>
+                              <a:schemeClr val="tx1"/>
+                            </a:solidFill>
+                            <a:latin typeface="Cambria Math" panose="02040503050406030204" pitchFamily="18" charset="0"/>
+                          </a:rPr>
+                        </m:ctrlPr>
+                      </m:dPr>
+                      <m:e>
+                        <m:r>
+                          <a:rPr lang="en-US" b="0" i="1" smtClean="0">
+                            <a:solidFill>
+                              <a:schemeClr val="tx1"/>
+                            </a:solidFill>
+                            <a:latin typeface="Cambria Math" panose="02040503050406030204" pitchFamily="18" charset="0"/>
+                          </a:rPr>
+                          <m:t>𝛽</m:t>
+                        </m:r>
+                      </m:e>
+                    </m:d>
+                    <m:r>
+                      <a:rPr lang="en-US" i="1">
+                        <a:solidFill>
+                          <a:schemeClr val="tx1"/>
+                        </a:solidFill>
+                        <a:latin typeface="Cambria Math" panose="02040503050406030204" pitchFamily="18" charset="0"/>
+                      </a:rPr>
+                      <m:t>=</m:t>
+                    </m:r>
+                    <m:d>
+                      <m:dPr>
+                        <m:begChr m:val="["/>
+                        <m:endChr m:val="]"/>
+                        <m:ctrlPr>
+                          <a:rPr lang="en-US" i="1">
+                            <a:solidFill>
+                              <a:schemeClr val="tx1"/>
+                            </a:solidFill>
+                            <a:latin typeface="Cambria Math" panose="02040503050406030204" pitchFamily="18" charset="0"/>
+                          </a:rPr>
+                        </m:ctrlPr>
+                      </m:dPr>
+                      <m:e>
+                        <m:m>
+                          <m:mPr>
+                            <m:mcs>
+                              <m:mc>
+                                <m:mcPr>
+                                  <m:count m:val="3"/>
+                                  <m:mcJc m:val="center"/>
+                                </m:mcPr>
+                              </m:mc>
+                            </m:mcs>
+                            <m:ctrlPr>
+                              <a:rPr lang="en-US" i="1">
+                                <a:solidFill>
+                                  <a:schemeClr val="tx1"/>
+                                </a:solidFill>
+                                <a:latin typeface="Cambria Math" panose="02040503050406030204" pitchFamily="18" charset="0"/>
+                              </a:rPr>
+                            </m:ctrlPr>
+                          </m:mPr>
+                          <m:mr>
+                            <m:e>
+                              <m:r>
+                                <m:rPr>
+                                  <m:brk m:alnAt="7"/>
+                                </m:rPr>
+                                <a:rPr lang="en-US" b="0" i="1" smtClean="0">
+                                  <a:solidFill>
+                                    <a:schemeClr val="tx1"/>
+                                  </a:solidFill>
+                                  <a:latin typeface="Cambria Math" panose="02040503050406030204" pitchFamily="18" charset="0"/>
+                                </a:rPr>
+                                <m:t>𝑐</m:t>
+                              </m:r>
+                              <m:r>
+                                <a:rPr lang="en-US" b="0" i="1" smtClean="0">
+                                  <a:solidFill>
+                                    <a:schemeClr val="tx1"/>
+                                  </a:solidFill>
+                                  <a:latin typeface="Cambria Math" panose="02040503050406030204" pitchFamily="18" charset="0"/>
+                                </a:rPr>
+                                <m:t>𝛽</m:t>
+                              </m:r>
+                            </m:e>
+                            <m:e>
+                              <m:r>
+                                <a:rPr lang="en-US" b="0" i="1" smtClean="0">
+                                  <a:solidFill>
+                                    <a:schemeClr val="tx1"/>
+                                  </a:solidFill>
+                                  <a:latin typeface="Cambria Math" panose="02040503050406030204" pitchFamily="18" charset="0"/>
+                                </a:rPr>
+                                <m:t>0</m:t>
+                              </m:r>
+                            </m:e>
+                            <m:e>
+                              <m:r>
+                                <a:rPr lang="en-US" b="0" i="1" smtClean="0">
+                                  <a:solidFill>
+                                    <a:schemeClr val="tx1"/>
+                                  </a:solidFill>
+                                  <a:latin typeface="Cambria Math" panose="02040503050406030204" pitchFamily="18" charset="0"/>
+                                </a:rPr>
+                                <m:t>𝑠</m:t>
+                              </m:r>
+                              <m:r>
+                                <a:rPr lang="en-US" b="0" i="1" smtClean="0">
+                                  <a:solidFill>
+                                    <a:schemeClr val="tx1"/>
+                                  </a:solidFill>
+                                  <a:latin typeface="Cambria Math" panose="02040503050406030204" pitchFamily="18" charset="0"/>
+                                </a:rPr>
+                                <m:t>𝛽</m:t>
+                              </m:r>
+                            </m:e>
+                          </m:mr>
+                          <m:mr>
+                            <m:e>
+                              <m:r>
+                                <a:rPr lang="en-US" b="0" i="1" smtClean="0">
+                                  <a:solidFill>
+                                    <a:schemeClr val="tx1"/>
+                                  </a:solidFill>
+                                  <a:latin typeface="Cambria Math" panose="02040503050406030204" pitchFamily="18" charset="0"/>
+                                </a:rPr>
+                                <m:t>0</m:t>
+                              </m:r>
+                            </m:e>
+                            <m:e>
+                              <m:r>
+                                <a:rPr lang="en-US" b="0" i="1" smtClean="0">
+                                  <a:solidFill>
+                                    <a:schemeClr val="tx1"/>
+                                  </a:solidFill>
+                                  <a:latin typeface="Cambria Math" panose="02040503050406030204" pitchFamily="18" charset="0"/>
+                                </a:rPr>
+                                <m:t>1</m:t>
+                              </m:r>
+                            </m:e>
+                            <m:e>
+                              <m:r>
+                                <a:rPr lang="en-US" b="0" i="1" smtClean="0">
+                                  <a:solidFill>
+                                    <a:schemeClr val="tx1"/>
+                                  </a:solidFill>
+                                  <a:latin typeface="Cambria Math" panose="02040503050406030204" pitchFamily="18" charset="0"/>
+                                </a:rPr>
+                                <m:t>0</m:t>
+                              </m:r>
+                            </m:e>
+                          </m:mr>
+                          <m:mr>
+                            <m:e>
+                              <m:r>
+                                <a:rPr lang="en-US" b="0" i="1" smtClean="0">
+                                  <a:solidFill>
+                                    <a:schemeClr val="tx1"/>
+                                  </a:solidFill>
+                                  <a:latin typeface="Cambria Math" panose="02040503050406030204" pitchFamily="18" charset="0"/>
+                                </a:rPr>
+                                <m:t>−</m:t>
+                              </m:r>
+                              <m:r>
+                                <a:rPr lang="en-US" b="0" i="1" smtClean="0">
+                                  <a:solidFill>
+                                    <a:schemeClr val="tx1"/>
+                                  </a:solidFill>
+                                  <a:latin typeface="Cambria Math" panose="02040503050406030204" pitchFamily="18" charset="0"/>
+                                </a:rPr>
+                                <m:t>𝑠</m:t>
+                              </m:r>
+                              <m:r>
+                                <a:rPr lang="en-US" b="0" i="1" smtClean="0">
+                                  <a:solidFill>
+                                    <a:schemeClr val="tx1"/>
+                                  </a:solidFill>
+                                  <a:latin typeface="Cambria Math" panose="02040503050406030204" pitchFamily="18" charset="0"/>
+                                </a:rPr>
+                                <m:t>𝛽</m:t>
+                              </m:r>
+                            </m:e>
+                            <m:e>
+                              <m:r>
+                                <a:rPr lang="en-US" b="0" i="1" smtClean="0">
+                                  <a:solidFill>
+                                    <a:schemeClr val="tx1"/>
+                                  </a:solidFill>
+                                  <a:latin typeface="Cambria Math" panose="02040503050406030204" pitchFamily="18" charset="0"/>
+                                </a:rPr>
+                                <m:t>0</m:t>
+                              </m:r>
+                            </m:e>
+                            <m:e>
+                              <m:r>
+                                <a:rPr lang="en-US" b="0" i="1" smtClean="0">
+                                  <a:solidFill>
+                                    <a:schemeClr val="tx1"/>
+                                  </a:solidFill>
+                                  <a:latin typeface="Cambria Math" panose="02040503050406030204" pitchFamily="18" charset="0"/>
+                                </a:rPr>
+                                <m:t>𝑐</m:t>
+                              </m:r>
+                              <m:r>
+                                <a:rPr lang="en-US" b="0" i="1" smtClean="0">
+                                  <a:solidFill>
+                                    <a:schemeClr val="tx1"/>
+                                  </a:solidFill>
+                                  <a:latin typeface="Cambria Math" panose="02040503050406030204" pitchFamily="18" charset="0"/>
+                                </a:rPr>
+                                <m:t>𝛽</m:t>
+                              </m:r>
+                            </m:e>
+                          </m:mr>
+                        </m:m>
+                      </m:e>
+                    </m:d>
+                  </m:oMath>
+                </a14:m>
+                <a:r>
+                  <a:rPr lang="en-US" dirty="0" smtClean="0">
+                    <a:solidFill>
+                      <a:schemeClr val="tx1"/>
+                    </a:solidFill>
+                  </a:rPr>
+                  <a:t>    </a:t>
+                </a:r>
+                <a14:m>
+                  <m:oMath xmlns:m="http://schemas.openxmlformats.org/officeDocument/2006/math">
+                    <m:sSub>
+                      <m:sSubPr>
+                        <m:ctrlPr>
+                          <a:rPr lang="en-US" i="1">
+                            <a:solidFill>
+                              <a:schemeClr val="tx1"/>
+                            </a:solidFill>
+                            <a:latin typeface="Cambria Math" panose="02040503050406030204" pitchFamily="18" charset="0"/>
+                          </a:rPr>
+                        </m:ctrlPr>
+                      </m:sSubPr>
+                      <m:e>
+                        <m:r>
+                          <a:rPr lang="en-US" i="1">
+                            <a:solidFill>
+                              <a:schemeClr val="tx1"/>
+                            </a:solidFill>
+                            <a:latin typeface="Cambria Math" panose="02040503050406030204" pitchFamily="18" charset="0"/>
+                          </a:rPr>
+                          <m:t>𝑅</m:t>
+                        </m:r>
+                      </m:e>
+                      <m:sub>
+                        <m:r>
+                          <a:rPr lang="en-US" b="0" i="1" smtClean="0">
+                            <a:solidFill>
+                              <a:schemeClr val="tx1"/>
+                            </a:solidFill>
+                            <a:latin typeface="Cambria Math" panose="02040503050406030204" pitchFamily="18" charset="0"/>
+                          </a:rPr>
+                          <m:t>𝑍</m:t>
+                        </m:r>
+                      </m:sub>
+                    </m:sSub>
+                    <m:d>
+                      <m:dPr>
+                        <m:ctrlPr>
+                          <a:rPr lang="en-US" i="1">
+                            <a:solidFill>
+                              <a:schemeClr val="tx1"/>
+                            </a:solidFill>
+                            <a:latin typeface="Cambria Math" panose="02040503050406030204" pitchFamily="18" charset="0"/>
+                          </a:rPr>
+                        </m:ctrlPr>
+                      </m:dPr>
+                      <m:e>
+                        <m:r>
+                          <a:rPr lang="en-US" b="0" i="1" smtClean="0">
+                            <a:solidFill>
+                              <a:schemeClr val="tx1"/>
+                            </a:solidFill>
+                            <a:latin typeface="Cambria Math" panose="02040503050406030204" pitchFamily="18" charset="0"/>
+                          </a:rPr>
+                          <m:t>𝛼</m:t>
+                        </m:r>
+                      </m:e>
+                    </m:d>
+                    <m:r>
+                      <a:rPr lang="en-US" i="1">
+                        <a:solidFill>
+                          <a:schemeClr val="tx1"/>
+                        </a:solidFill>
+                        <a:latin typeface="Cambria Math" panose="02040503050406030204" pitchFamily="18" charset="0"/>
+                      </a:rPr>
+                      <m:t>=</m:t>
+                    </m:r>
+                    <m:d>
+                      <m:dPr>
+                        <m:begChr m:val="["/>
+                        <m:endChr m:val="]"/>
+                        <m:ctrlPr>
+                          <a:rPr lang="en-US" i="1">
+                            <a:solidFill>
+                              <a:schemeClr val="tx1"/>
+                            </a:solidFill>
+                            <a:latin typeface="Cambria Math" panose="02040503050406030204" pitchFamily="18" charset="0"/>
+                          </a:rPr>
+                        </m:ctrlPr>
+                      </m:dPr>
+                      <m:e>
+                        <m:m>
+                          <m:mPr>
+                            <m:mcs>
+                              <m:mc>
+                                <m:mcPr>
+                                  <m:count m:val="3"/>
+                                  <m:mcJc m:val="center"/>
+                                </m:mcPr>
+                              </m:mc>
+                            </m:mcs>
+                            <m:ctrlPr>
+                              <a:rPr lang="en-US" i="1">
+                                <a:solidFill>
+                                  <a:schemeClr val="tx1"/>
+                                </a:solidFill>
+                                <a:latin typeface="Cambria Math" panose="02040503050406030204" pitchFamily="18" charset="0"/>
+                              </a:rPr>
+                            </m:ctrlPr>
+                          </m:mPr>
+                          <m:mr>
+                            <m:e>
+                              <m:r>
+                                <m:rPr>
+                                  <m:brk m:alnAt="7"/>
+                                </m:rPr>
+                                <a:rPr lang="en-US" b="0" i="1" smtClean="0">
+                                  <a:solidFill>
+                                    <a:schemeClr val="tx1"/>
+                                  </a:solidFill>
+                                  <a:latin typeface="Cambria Math" panose="02040503050406030204" pitchFamily="18" charset="0"/>
+                                </a:rPr>
+                                <m:t>𝑐</m:t>
+                              </m:r>
+                              <m:r>
+                                <a:rPr lang="en-US" b="0" i="1" smtClean="0">
+                                  <a:solidFill>
+                                    <a:schemeClr val="tx1"/>
+                                  </a:solidFill>
+                                  <a:latin typeface="Cambria Math" panose="02040503050406030204" pitchFamily="18" charset="0"/>
+                                </a:rPr>
+                                <m:t>𝛼</m:t>
+                              </m:r>
+                            </m:e>
+                            <m:e>
+                              <m:r>
+                                <a:rPr lang="en-US" b="0" i="1" smtClean="0">
+                                  <a:solidFill>
+                                    <a:schemeClr val="tx1"/>
+                                  </a:solidFill>
+                                  <a:latin typeface="Cambria Math" panose="02040503050406030204" pitchFamily="18" charset="0"/>
+                                </a:rPr>
+                                <m:t>−</m:t>
+                              </m:r>
+                              <m:r>
+                                <a:rPr lang="en-US" b="0" i="1" smtClean="0">
+                                  <a:solidFill>
+                                    <a:schemeClr val="tx1"/>
+                                  </a:solidFill>
+                                  <a:latin typeface="Cambria Math" panose="02040503050406030204" pitchFamily="18" charset="0"/>
+                                </a:rPr>
+                                <m:t>𝑠</m:t>
+                              </m:r>
+                              <m:r>
+                                <a:rPr lang="en-US" b="0" i="1" smtClean="0">
+                                  <a:solidFill>
+                                    <a:schemeClr val="tx1"/>
+                                  </a:solidFill>
+                                  <a:latin typeface="Cambria Math" panose="02040503050406030204" pitchFamily="18" charset="0"/>
+                                </a:rPr>
+                                <m:t>𝛼</m:t>
+                              </m:r>
+                            </m:e>
+                            <m:e>
+                              <m:r>
+                                <a:rPr lang="en-US" b="0" i="1" smtClean="0">
+                                  <a:solidFill>
+                                    <a:schemeClr val="tx1"/>
+                                  </a:solidFill>
+                                  <a:latin typeface="Cambria Math" panose="02040503050406030204" pitchFamily="18" charset="0"/>
+                                </a:rPr>
+                                <m:t>0</m:t>
+                              </m:r>
+                            </m:e>
+                          </m:mr>
+                          <m:mr>
+                            <m:e>
+                              <m:r>
+                                <a:rPr lang="en-US" b="0" i="1" smtClean="0">
+                                  <a:solidFill>
+                                    <a:schemeClr val="tx1"/>
+                                  </a:solidFill>
+                                  <a:latin typeface="Cambria Math" panose="02040503050406030204" pitchFamily="18" charset="0"/>
+                                </a:rPr>
+                                <m:t>𝑠</m:t>
+                              </m:r>
+                              <m:r>
+                                <a:rPr lang="en-US" b="0" i="1" smtClean="0">
+                                  <a:solidFill>
+                                    <a:schemeClr val="tx1"/>
+                                  </a:solidFill>
+                                  <a:latin typeface="Cambria Math" panose="02040503050406030204" pitchFamily="18" charset="0"/>
+                                </a:rPr>
+                                <m:t>𝛼</m:t>
+                              </m:r>
+                            </m:e>
+                            <m:e>
+                              <m:r>
+                                <a:rPr lang="en-US" b="0" i="1" smtClean="0">
+                                  <a:solidFill>
+                                    <a:schemeClr val="tx1"/>
+                                  </a:solidFill>
+                                  <a:latin typeface="Cambria Math" panose="02040503050406030204" pitchFamily="18" charset="0"/>
+                                </a:rPr>
+                                <m:t>𝑐</m:t>
+                              </m:r>
+                              <m:r>
+                                <a:rPr lang="en-US" b="0" i="1" smtClean="0">
+                                  <a:solidFill>
+                                    <a:schemeClr val="tx1"/>
+                                  </a:solidFill>
+                                  <a:latin typeface="Cambria Math" panose="02040503050406030204" pitchFamily="18" charset="0"/>
+                                </a:rPr>
+                                <m:t>𝛼</m:t>
+                              </m:r>
+                            </m:e>
+                            <m:e>
+                              <m:r>
+                                <a:rPr lang="en-US" b="0" i="1" smtClean="0">
+                                  <a:solidFill>
+                                    <a:schemeClr val="tx1"/>
+                                  </a:solidFill>
+                                  <a:latin typeface="Cambria Math" panose="02040503050406030204" pitchFamily="18" charset="0"/>
+                                </a:rPr>
+                                <m:t>0</m:t>
+                              </m:r>
+                            </m:e>
+                          </m:mr>
+                          <m:mr>
+                            <m:e>
+                              <m:r>
+                                <a:rPr lang="en-US" b="0" i="1" smtClean="0">
+                                  <a:solidFill>
+                                    <a:schemeClr val="tx1"/>
+                                  </a:solidFill>
+                                  <a:latin typeface="Cambria Math" panose="02040503050406030204" pitchFamily="18" charset="0"/>
+                                </a:rPr>
+                                <m:t>0</m:t>
+                              </m:r>
+                            </m:e>
+                            <m:e>
+                              <m:r>
+                                <a:rPr lang="en-US" b="0" i="1" smtClean="0">
+                                  <a:solidFill>
+                                    <a:schemeClr val="tx1"/>
+                                  </a:solidFill>
+                                  <a:latin typeface="Cambria Math" panose="02040503050406030204" pitchFamily="18" charset="0"/>
+                                </a:rPr>
+                                <m:t>0</m:t>
+                              </m:r>
+                            </m:e>
+                            <m:e>
+                              <m:r>
+                                <a:rPr lang="en-US" b="0" i="1" smtClean="0">
+                                  <a:solidFill>
+                                    <a:schemeClr val="tx1"/>
+                                  </a:solidFill>
+                                  <a:latin typeface="Cambria Math" panose="02040503050406030204" pitchFamily="18" charset="0"/>
+                                </a:rPr>
+                                <m:t>1</m:t>
+                              </m:r>
+                            </m:e>
+                          </m:mr>
+                        </m:m>
+                      </m:e>
+                    </m:d>
+                  </m:oMath>
+                </a14:m>
+                <a:endParaRPr lang="en-US" dirty="0" smtClean="0">
+                  <a:solidFill>
+                    <a:schemeClr val="tx1"/>
+                  </a:solidFill>
+                </a:endParaRPr>
+              </a:p>
+            </p:txBody>
+          </p:sp>
+        </mc:Choice>
+        <mc:Fallback>
+          <p:sp>
+            <p:nvSpPr>
+              <p:cNvPr id="3" name="Content Placeholder 2"/>
+              <p:cNvSpPr>
+                <a:spLocks noGrp="1" noRot="1" noChangeAspect="1" noMove="1" noResize="1" noEditPoints="1" noAdjustHandles="1" noChangeArrowheads="1" noChangeShapeType="1" noTextEdit="1"/>
+              </p:cNvSpPr>
+              <p:nvPr>
+                <p:ph idx="1"/>
+              </p:nvPr>
+            </p:nvSpPr>
+            <p:spPr>
+              <a:xfrm>
+                <a:off x="1097279" y="1845734"/>
+                <a:ext cx="10721681" cy="4023360"/>
+              </a:xfrm>
+              <a:blipFill rotWithShape="0">
+                <a:blip r:embed="rId2"/>
+                <a:stretch>
+                  <a:fillRect l="-1364" t="-1667"/>
+                </a:stretch>
+              </a:blipFill>
+            </p:spPr>
+            <p:txBody>
+              <a:bodyPr/>
+              <a:lstStyle/>
+              <a:p>
+                <a:r>
+                  <a:rPr lang="en-US">
+                    <a:noFill/>
+                  </a:rPr>
+                  <a:t> </a:t>
+                </a:r>
+              </a:p>
+            </p:txBody>
+          </p:sp>
+        </mc:Fallback>
+      </mc:AlternateContent>
       <p:sp>
         <p:nvSpPr>
           <p:cNvPr id="4" name="Slide Number Placeholder 3"/>
@@ -5067,6 +6682,13 @@
   <p:clrMapOvr>
     <a:masterClrMapping/>
   </p:clrMapOvr>
+  <p:timing>
+    <p:tnLst>
+      <p:par>
+        <p:cTn id="1" dur="indefinite" restart="never" nodeType="tmRoot"/>
+      </p:par>
+    </p:tnLst>
+  </p:timing>
 </p:sld>
 </file>
 
@@ -5102,45 +6724,948 @@
           <a:bodyPr/>
           <a:lstStyle/>
           <a:p>
+            <a:r>
+              <a:rPr lang="en-US" dirty="0" smtClean="0"/>
+              <a:t>Mapping – General Condition</a:t>
+            </a:r>
             <a:endParaRPr lang="en-US" dirty="0"/>
           </a:p>
         </p:txBody>
       </p:sp>
-      <p:sp>
-        <p:nvSpPr>
-          <p:cNvPr id="3" name="Content Placeholder 2"/>
-          <p:cNvSpPr>
-            <a:spLocks noGrp="1"/>
-          </p:cNvSpPr>
-          <p:nvPr>
-            <p:ph idx="1"/>
-          </p:nvPr>
-        </p:nvSpPr>
-        <p:spPr/>
-        <p:txBody>
-          <a:bodyPr/>
-          <a:lstStyle/>
-          <a:p>
-            <a:pPr>
-              <a:buFont typeface="Arial" panose="020B0604020202020204" pitchFamily="34" charset="0"/>
-              <a:buChar char="•"/>
-            </a:pPr>
-            <a:r>
-              <a:rPr lang="en-US" dirty="0" smtClean="0">
-                <a:solidFill>
-                  <a:schemeClr val="tx1"/>
-                </a:solidFill>
-              </a:rPr>
-              <a:t> V</a:t>
-            </a:r>
-            <a:endParaRPr lang="en-US" dirty="0">
-              <a:solidFill>
-                <a:schemeClr val="tx1"/>
-              </a:solidFill>
-            </a:endParaRPr>
-          </a:p>
-        </p:txBody>
-      </p:sp>
+      <mc:AlternateContent xmlns:mc="http://schemas.openxmlformats.org/markup-compatibility/2006">
+        <mc:Choice xmlns:a14="http://schemas.microsoft.com/office/drawing/2010/main" Requires="a14">
+          <p:sp>
+            <p:nvSpPr>
+              <p:cNvPr id="3" name="Content Placeholder 2"/>
+              <p:cNvSpPr>
+                <a:spLocks noGrp="1"/>
+              </p:cNvSpPr>
+              <p:nvPr>
+                <p:ph idx="1"/>
+              </p:nvPr>
+            </p:nvSpPr>
+            <p:spPr/>
+            <p:txBody>
+              <a:bodyPr/>
+              <a:lstStyle/>
+              <a:p>
+                <a:pPr>
+                  <a:buFont typeface="Arial" panose="020B0604020202020204" pitchFamily="34" charset="0"/>
+                  <a:buChar char="•"/>
+                </a:pPr>
+                <a:r>
+                  <a:rPr lang="en-US" dirty="0" smtClean="0">
+                    <a:solidFill>
+                      <a:schemeClr val="tx1"/>
+                    </a:solidFill>
+                  </a:rPr>
+                  <a:t> If we have both translation and rotation then the </a:t>
+                </a:r>
+                <a:r>
+                  <a:rPr lang="en-US" dirty="0">
+                    <a:solidFill>
+                      <a:schemeClr val="tx1"/>
+                    </a:solidFill>
+                  </a:rPr>
+                  <a:t>position of the point expressed in frame </a:t>
+                </a:r>
+                <a:r>
+                  <a:rPr lang="en-US" dirty="0" smtClean="0">
+                    <a:solidFill>
+                      <a:schemeClr val="tx1"/>
+                    </a:solidFill>
+                  </a:rPr>
+                  <a:t>“B” </a:t>
+                </a:r>
+                <a:r>
+                  <a:rPr lang="en-US" dirty="0">
+                    <a:solidFill>
+                      <a:schemeClr val="tx1"/>
+                    </a:solidFill>
+                  </a:rPr>
+                  <a:t>can be expressed in frame </a:t>
+                </a:r>
+                <a:r>
+                  <a:rPr lang="en-US" dirty="0" smtClean="0">
+                    <a:solidFill>
+                      <a:schemeClr val="tx1"/>
+                    </a:solidFill>
+                  </a:rPr>
+                  <a:t>“A” as follows: </a:t>
+                </a:r>
+                <a14:m>
+                  <m:oMath xmlns:m="http://schemas.openxmlformats.org/officeDocument/2006/math">
+                    <m:sPre>
+                      <m:sPrePr>
+                        <m:ctrlPr>
+                          <a:rPr lang="en-US" i="1" smtClean="0">
+                            <a:solidFill>
+                              <a:schemeClr val="tx1"/>
+                            </a:solidFill>
+                            <a:latin typeface="Cambria Math" panose="02040503050406030204" pitchFamily="18" charset="0"/>
+                          </a:rPr>
+                        </m:ctrlPr>
+                      </m:sPrePr>
+                      <m:sub/>
+                      <m:sup>
+                        <m:r>
+                          <a:rPr lang="en-US" b="0" i="1" smtClean="0">
+                            <a:latin typeface="Cambria Math" panose="02040503050406030204" pitchFamily="18" charset="0"/>
+                          </a:rPr>
+                          <m:t>𝐴</m:t>
+                        </m:r>
+                      </m:sup>
+                      <m:e>
+                        <m:r>
+                          <a:rPr lang="en-US" b="0" i="1" smtClean="0">
+                            <a:latin typeface="Cambria Math" panose="02040503050406030204" pitchFamily="18" charset="0"/>
+                          </a:rPr>
+                          <m:t>𝑃</m:t>
+                        </m:r>
+                      </m:e>
+                    </m:sPre>
+                    <m:r>
+                      <a:rPr lang="en-US" b="0" i="1" smtClean="0">
+                        <a:latin typeface="Cambria Math" panose="02040503050406030204" pitchFamily="18" charset="0"/>
+                      </a:rPr>
+                      <m:t>=</m:t>
+                    </m:r>
+                    <m:sPre>
+                      <m:sPrePr>
+                        <m:ctrlPr>
+                          <a:rPr lang="en-US" i="1">
+                            <a:solidFill>
+                              <a:schemeClr val="tx1"/>
+                            </a:solidFill>
+                            <a:latin typeface="Cambria Math" panose="02040503050406030204" pitchFamily="18" charset="0"/>
+                          </a:rPr>
+                        </m:ctrlPr>
+                      </m:sPrePr>
+                      <m:sub>
+                        <m:r>
+                          <a:rPr lang="en-US" b="0" i="1" smtClean="0">
+                            <a:solidFill>
+                              <a:schemeClr val="tx1"/>
+                            </a:solidFill>
+                            <a:latin typeface="Cambria Math" panose="02040503050406030204" pitchFamily="18" charset="0"/>
+                          </a:rPr>
+                          <m:t>𝐵</m:t>
+                        </m:r>
+                      </m:sub>
+                      <m:sup>
+                        <m:r>
+                          <a:rPr lang="en-US" b="0" i="1" smtClean="0">
+                            <a:solidFill>
+                              <a:schemeClr val="tx1"/>
+                            </a:solidFill>
+                            <a:latin typeface="Cambria Math" panose="02040503050406030204" pitchFamily="18" charset="0"/>
+                          </a:rPr>
+                          <m:t>𝐴</m:t>
+                        </m:r>
+                      </m:sup>
+                      <m:e>
+                        <m:r>
+                          <a:rPr lang="en-US" b="0" i="1" smtClean="0">
+                            <a:solidFill>
+                              <a:schemeClr val="tx1"/>
+                            </a:solidFill>
+                            <a:latin typeface="Cambria Math" panose="02040503050406030204" pitchFamily="18" charset="0"/>
+                          </a:rPr>
+                          <m:t>𝑅</m:t>
+                        </m:r>
+                      </m:e>
+                    </m:sPre>
+                    <m:sPre>
+                      <m:sPrePr>
+                        <m:ctrlPr>
+                          <a:rPr lang="en-US" i="1">
+                            <a:solidFill>
+                              <a:schemeClr val="tx1"/>
+                            </a:solidFill>
+                            <a:latin typeface="Cambria Math" panose="02040503050406030204" pitchFamily="18" charset="0"/>
+                          </a:rPr>
+                        </m:ctrlPr>
+                      </m:sPrePr>
+                      <m:sub/>
+                      <m:sup>
+                        <m:r>
+                          <a:rPr lang="en-US" b="0" i="1" smtClean="0">
+                            <a:solidFill>
+                              <a:schemeClr val="tx1"/>
+                            </a:solidFill>
+                            <a:latin typeface="Cambria Math" panose="02040503050406030204" pitchFamily="18" charset="0"/>
+                          </a:rPr>
+                          <m:t>𝐴</m:t>
+                        </m:r>
+                      </m:sup>
+                      <m:e>
+                        <m:r>
+                          <a:rPr lang="en-US" b="0" i="1" smtClean="0">
+                            <a:solidFill>
+                              <a:schemeClr val="tx1"/>
+                            </a:solidFill>
+                            <a:latin typeface="Cambria Math" panose="02040503050406030204" pitchFamily="18" charset="0"/>
+                          </a:rPr>
+                          <m:t>𝑃</m:t>
+                        </m:r>
+                      </m:e>
+                    </m:sPre>
+                    <m:r>
+                      <a:rPr lang="en-US" b="0" i="1" smtClean="0">
+                        <a:solidFill>
+                          <a:schemeClr val="tx1"/>
+                        </a:solidFill>
+                        <a:latin typeface="Cambria Math" panose="02040503050406030204" pitchFamily="18" charset="0"/>
+                      </a:rPr>
+                      <m:t>+</m:t>
+                    </m:r>
+                    <m:sPre>
+                      <m:sPrePr>
+                        <m:ctrlPr>
+                          <a:rPr lang="en-US" i="1">
+                            <a:solidFill>
+                              <a:schemeClr val="tx1"/>
+                            </a:solidFill>
+                            <a:latin typeface="Cambria Math" panose="02040503050406030204" pitchFamily="18" charset="0"/>
+                          </a:rPr>
+                        </m:ctrlPr>
+                      </m:sPrePr>
+                      <m:sub/>
+                      <m:sup>
+                        <m:r>
+                          <a:rPr lang="en-US" b="0" i="1" smtClean="0">
+                            <a:solidFill>
+                              <a:schemeClr val="tx1"/>
+                            </a:solidFill>
+                            <a:latin typeface="Cambria Math" panose="02040503050406030204" pitchFamily="18" charset="0"/>
+                          </a:rPr>
+                          <m:t>𝐴</m:t>
+                        </m:r>
+                      </m:sup>
+                      <m:e>
+                        <m:sSub>
+                          <m:sSubPr>
+                            <m:ctrlPr>
+                              <a:rPr lang="en-US" b="0" i="1" smtClean="0">
+                                <a:solidFill>
+                                  <a:schemeClr val="tx1"/>
+                                </a:solidFill>
+                                <a:latin typeface="Cambria Math" panose="02040503050406030204" pitchFamily="18" charset="0"/>
+                              </a:rPr>
+                            </m:ctrlPr>
+                          </m:sSubPr>
+                          <m:e>
+                            <m:r>
+                              <a:rPr lang="en-US" b="0" i="1" smtClean="0">
+                                <a:solidFill>
+                                  <a:schemeClr val="tx1"/>
+                                </a:solidFill>
+                                <a:latin typeface="Cambria Math" panose="02040503050406030204" pitchFamily="18" charset="0"/>
+                              </a:rPr>
+                              <m:t>𝑃</m:t>
+                            </m:r>
+                          </m:e>
+                          <m:sub>
+                            <m:r>
+                              <a:rPr lang="en-US" b="0" i="1" smtClean="0">
+                                <a:solidFill>
+                                  <a:schemeClr val="tx1"/>
+                                </a:solidFill>
+                                <a:latin typeface="Cambria Math" panose="02040503050406030204" pitchFamily="18" charset="0"/>
+                              </a:rPr>
+                              <m:t>𝐵𝑂𝑅𝐺</m:t>
+                            </m:r>
+                          </m:sub>
+                        </m:sSub>
+                      </m:e>
+                    </m:sPre>
+                    <m:r>
+                      <a:rPr lang="en-US" b="0" i="1" smtClean="0">
+                        <a:solidFill>
+                          <a:schemeClr val="tx1"/>
+                        </a:solidFill>
+                        <a:latin typeface="Cambria Math" panose="02040503050406030204" pitchFamily="18" charset="0"/>
+                      </a:rPr>
+                      <m:t>=</m:t>
+                    </m:r>
+                    <m:sPre>
+                      <m:sPrePr>
+                        <m:ctrlPr>
+                          <a:rPr lang="en-US" i="1">
+                            <a:solidFill>
+                              <a:schemeClr val="tx1"/>
+                            </a:solidFill>
+                            <a:latin typeface="Cambria Math" panose="02040503050406030204" pitchFamily="18" charset="0"/>
+                          </a:rPr>
+                        </m:ctrlPr>
+                      </m:sPrePr>
+                      <m:sub>
+                        <m:r>
+                          <a:rPr lang="en-US" b="0" i="1" smtClean="0">
+                            <a:solidFill>
+                              <a:schemeClr val="tx1"/>
+                            </a:solidFill>
+                            <a:latin typeface="Cambria Math" panose="02040503050406030204" pitchFamily="18" charset="0"/>
+                          </a:rPr>
+                          <m:t>𝐵</m:t>
+                        </m:r>
+                      </m:sub>
+                      <m:sup>
+                        <m:r>
+                          <a:rPr lang="en-US" b="0" i="1" smtClean="0">
+                            <a:solidFill>
+                              <a:schemeClr val="tx1"/>
+                            </a:solidFill>
+                            <a:latin typeface="Cambria Math" panose="02040503050406030204" pitchFamily="18" charset="0"/>
+                          </a:rPr>
+                          <m:t>𝐴</m:t>
+                        </m:r>
+                      </m:sup>
+                      <m:e>
+                        <m:r>
+                          <a:rPr lang="en-US" b="0" i="1" smtClean="0">
+                            <a:solidFill>
+                              <a:schemeClr val="tx1"/>
+                            </a:solidFill>
+                            <a:latin typeface="Cambria Math" panose="02040503050406030204" pitchFamily="18" charset="0"/>
+                          </a:rPr>
+                          <m:t>𝑇</m:t>
+                        </m:r>
+                      </m:e>
+                    </m:sPre>
+                    <m:sPre>
+                      <m:sPrePr>
+                        <m:ctrlPr>
+                          <a:rPr lang="en-US" i="1">
+                            <a:solidFill>
+                              <a:schemeClr val="tx1"/>
+                            </a:solidFill>
+                            <a:latin typeface="Cambria Math" panose="02040503050406030204" pitchFamily="18" charset="0"/>
+                          </a:rPr>
+                        </m:ctrlPr>
+                      </m:sPrePr>
+                      <m:sub/>
+                      <m:sup>
+                        <m:r>
+                          <a:rPr lang="en-US" b="0" i="1" smtClean="0">
+                            <a:solidFill>
+                              <a:schemeClr val="tx1"/>
+                            </a:solidFill>
+                            <a:latin typeface="Cambria Math" panose="02040503050406030204" pitchFamily="18" charset="0"/>
+                          </a:rPr>
+                          <m:t>𝐵</m:t>
+                        </m:r>
+                      </m:sup>
+                      <m:e>
+                        <m:r>
+                          <a:rPr lang="en-US" b="0" i="1" smtClean="0">
+                            <a:solidFill>
+                              <a:schemeClr val="tx1"/>
+                            </a:solidFill>
+                            <a:latin typeface="Cambria Math" panose="02040503050406030204" pitchFamily="18" charset="0"/>
+                          </a:rPr>
+                          <m:t>𝑃</m:t>
+                        </m:r>
+                      </m:e>
+                    </m:sPre>
+                  </m:oMath>
+                </a14:m>
+                <a:r>
+                  <a:rPr lang="en-US" dirty="0">
+                    <a:solidFill>
+                      <a:schemeClr val="tx1"/>
+                    </a:solidFill>
+                  </a:rPr>
+                  <a:t> </a:t>
+                </a:r>
+                <a:endParaRPr lang="en-US" dirty="0" smtClean="0">
+                  <a:solidFill>
+                    <a:schemeClr val="tx1"/>
+                  </a:solidFill>
+                </a:endParaRPr>
+              </a:p>
+              <a:p>
+                <a:pPr>
+                  <a:buFont typeface="Arial" panose="020B0604020202020204" pitchFamily="34" charset="0"/>
+                  <a:buChar char="•"/>
+                </a:pPr>
+                <a:r>
+                  <a:rPr lang="en-US" dirty="0">
+                    <a:solidFill>
+                      <a:schemeClr val="tx1"/>
+                    </a:solidFill>
+                  </a:rPr>
+                  <a:t> The homogeneous transform is a 4x4 matrix casting the rotation and translation </a:t>
+                </a:r>
+                <a:r>
+                  <a:rPr lang="en-US" dirty="0" smtClean="0">
+                    <a:solidFill>
+                      <a:schemeClr val="tx1"/>
+                    </a:solidFill>
+                  </a:rPr>
+                  <a:t>of a </a:t>
+                </a:r>
+                <a:r>
+                  <a:rPr lang="en-US" dirty="0">
+                    <a:solidFill>
+                      <a:schemeClr val="tx1"/>
+                    </a:solidFill>
+                  </a:rPr>
+                  <a:t>general transform into a single </a:t>
+                </a:r>
+                <a:r>
+                  <a:rPr lang="en-US" dirty="0" smtClean="0">
+                    <a:solidFill>
+                      <a:schemeClr val="tx1"/>
+                    </a:solidFill>
+                  </a:rPr>
+                  <a:t>matrix:</a:t>
+                </a:r>
+              </a:p>
+              <a:p>
+                <a:pPr marL="0" indent="0">
+                  <a:buNone/>
+                </a:pPr>
+                <a14:m>
+                  <m:oMathPara xmlns:m="http://schemas.openxmlformats.org/officeDocument/2006/math">
+                    <m:oMathParaPr>
+                      <m:jc m:val="centerGroup"/>
+                    </m:oMathParaPr>
+                    <m:oMath xmlns:m="http://schemas.openxmlformats.org/officeDocument/2006/math">
+                      <m:d>
+                        <m:dPr>
+                          <m:begChr m:val="["/>
+                          <m:endChr m:val="]"/>
+                          <m:ctrlPr>
+                            <a:rPr lang="en-US" i="1" smtClean="0">
+                              <a:solidFill>
+                                <a:schemeClr val="tx1"/>
+                              </a:solidFill>
+                              <a:latin typeface="Cambria Math" panose="02040503050406030204" pitchFamily="18" charset="0"/>
+                            </a:rPr>
+                          </m:ctrlPr>
+                        </m:dPr>
+                        <m:e>
+                          <m:m>
+                            <m:mPr>
+                              <m:mcs>
+                                <m:mc>
+                                  <m:mcPr>
+                                    <m:count m:val="1"/>
+                                    <m:mcJc m:val="center"/>
+                                  </m:mcPr>
+                                </m:mc>
+                              </m:mcs>
+                              <m:ctrlPr>
+                                <a:rPr lang="en-US" i="1" smtClean="0">
+                                  <a:solidFill>
+                                    <a:schemeClr val="tx1"/>
+                                  </a:solidFill>
+                                  <a:latin typeface="Cambria Math" panose="02040503050406030204" pitchFamily="18" charset="0"/>
+                                </a:rPr>
+                              </m:ctrlPr>
+                            </m:mPr>
+                            <m:mr>
+                              <m:e/>
+                            </m:mr>
+                            <m:mr>
+                              <m:e>
+                                <m:sPre>
+                                  <m:sPrePr>
+                                    <m:ctrlPr>
+                                      <a:rPr lang="en-US" b="0" i="1" smtClean="0">
+                                        <a:solidFill>
+                                          <a:schemeClr val="tx1"/>
+                                        </a:solidFill>
+                                        <a:latin typeface="Cambria Math" panose="02040503050406030204" pitchFamily="18" charset="0"/>
+                                      </a:rPr>
+                                    </m:ctrlPr>
+                                  </m:sPrePr>
+                                  <m:sub/>
+                                  <m:sup>
+                                    <m:r>
+                                      <a:rPr lang="en-US" b="0" i="1" smtClean="0">
+                                        <a:solidFill>
+                                          <a:schemeClr val="tx1"/>
+                                        </a:solidFill>
+                                        <a:latin typeface="Cambria Math" panose="02040503050406030204" pitchFamily="18" charset="0"/>
+                                      </a:rPr>
+                                      <m:t>𝐴</m:t>
+                                    </m:r>
+                                  </m:sup>
+                                  <m:e>
+                                    <m:r>
+                                      <a:rPr lang="en-US" b="0" i="1" smtClean="0">
+                                        <a:solidFill>
+                                          <a:schemeClr val="tx1"/>
+                                        </a:solidFill>
+                                        <a:latin typeface="Cambria Math" panose="02040503050406030204" pitchFamily="18" charset="0"/>
+                                      </a:rPr>
+                                      <m:t>𝑃</m:t>
+                                    </m:r>
+                                  </m:e>
+                                </m:sPre>
+                              </m:e>
+                            </m:mr>
+                            <m:mr>
+                              <m:e/>
+                            </m:mr>
+                            <m:mr>
+                              <m:e>
+                                <m:r>
+                                  <a:rPr lang="en-US" b="0" i="1" smtClean="0">
+                                    <a:solidFill>
+                                      <a:schemeClr val="tx1"/>
+                                    </a:solidFill>
+                                    <a:latin typeface="Cambria Math" panose="02040503050406030204" pitchFamily="18" charset="0"/>
+                                  </a:rPr>
+                                  <m:t>1</m:t>
+                                </m:r>
+                              </m:e>
+                            </m:mr>
+                          </m:m>
+                        </m:e>
+                      </m:d>
+                      <m:r>
+                        <a:rPr lang="en-US" b="0" i="1" smtClean="0">
+                          <a:solidFill>
+                            <a:schemeClr val="tx1"/>
+                          </a:solidFill>
+                          <a:latin typeface="Cambria Math" panose="02040503050406030204" pitchFamily="18" charset="0"/>
+                        </a:rPr>
+                        <m:t>=</m:t>
+                      </m:r>
+                      <m:d>
+                        <m:dPr>
+                          <m:begChr m:val="["/>
+                          <m:endChr m:val="]"/>
+                          <m:ctrlPr>
+                            <a:rPr lang="en-US" i="1">
+                              <a:solidFill>
+                                <a:schemeClr val="tx1"/>
+                              </a:solidFill>
+                              <a:latin typeface="Cambria Math" panose="02040503050406030204" pitchFamily="18" charset="0"/>
+                            </a:rPr>
+                          </m:ctrlPr>
+                        </m:dPr>
+                        <m:e>
+                          <m:m>
+                            <m:mPr>
+                              <m:mcs>
+                                <m:mc>
+                                  <m:mcPr>
+                                    <m:count m:val="1"/>
+                                    <m:mcJc m:val="center"/>
+                                  </m:mcPr>
+                                </m:mc>
+                              </m:mcs>
+                              <m:ctrlPr>
+                                <a:rPr lang="en-US" i="1">
+                                  <a:solidFill>
+                                    <a:schemeClr val="tx1"/>
+                                  </a:solidFill>
+                                  <a:latin typeface="Cambria Math" panose="02040503050406030204" pitchFamily="18" charset="0"/>
+                                </a:rPr>
+                              </m:ctrlPr>
+                            </m:mPr>
+                            <m:mr>
+                              <m:e/>
+                            </m:mr>
+                            <m:mr>
+                              <m:e/>
+                            </m:mr>
+                            <m:mr>
+                              <m:e/>
+                            </m:mr>
+                            <m:mr>
+                              <m:e>
+                                <m:r>
+                                  <a:rPr lang="en-US" b="0" i="1" smtClean="0">
+                                    <a:solidFill>
+                                      <a:schemeClr val="tx1"/>
+                                    </a:solidFill>
+                                    <a:latin typeface="Cambria Math" panose="02040503050406030204" pitchFamily="18" charset="0"/>
+                                  </a:rPr>
+                                  <m:t>0</m:t>
+                                </m:r>
+                              </m:e>
+                            </m:mr>
+                          </m:m>
+                          <m:m>
+                            <m:mPr>
+                              <m:mcs>
+                                <m:mc>
+                                  <m:mcPr>
+                                    <m:count m:val="1"/>
+                                    <m:mcJc m:val="center"/>
+                                  </m:mcPr>
+                                </m:mc>
+                              </m:mcs>
+                              <m:ctrlPr>
+                                <a:rPr lang="en-US" i="1">
+                                  <a:solidFill>
+                                    <a:schemeClr val="tx1"/>
+                                  </a:solidFill>
+                                  <a:latin typeface="Cambria Math" panose="02040503050406030204" pitchFamily="18" charset="0"/>
+                                </a:rPr>
+                              </m:ctrlPr>
+                            </m:mPr>
+                            <m:mr>
+                              <m:e/>
+                            </m:mr>
+                            <m:mr>
+                              <m:e>
+                                <m:sPre>
+                                  <m:sPrePr>
+                                    <m:ctrlPr>
+                                      <a:rPr lang="en-US" i="1">
+                                        <a:solidFill>
+                                          <a:schemeClr val="tx1"/>
+                                        </a:solidFill>
+                                        <a:latin typeface="Cambria Math" panose="02040503050406030204" pitchFamily="18" charset="0"/>
+                                      </a:rPr>
+                                    </m:ctrlPr>
+                                  </m:sPrePr>
+                                  <m:sub>
+                                    <m:r>
+                                      <a:rPr lang="en-US" i="1">
+                                        <a:solidFill>
+                                          <a:schemeClr val="tx1"/>
+                                        </a:solidFill>
+                                        <a:latin typeface="Cambria Math" panose="02040503050406030204" pitchFamily="18" charset="0"/>
+                                      </a:rPr>
+                                      <m:t>𝐵</m:t>
+                                    </m:r>
+                                  </m:sub>
+                                  <m:sup>
+                                    <m:r>
+                                      <a:rPr lang="en-US" i="1">
+                                        <a:solidFill>
+                                          <a:schemeClr val="tx1"/>
+                                        </a:solidFill>
+                                        <a:latin typeface="Cambria Math" panose="02040503050406030204" pitchFamily="18" charset="0"/>
+                                      </a:rPr>
+                                      <m:t>𝐴</m:t>
+                                    </m:r>
+                                  </m:sup>
+                                  <m:e>
+                                    <m:r>
+                                      <a:rPr lang="en-US" i="1">
+                                        <a:solidFill>
+                                          <a:schemeClr val="tx1"/>
+                                        </a:solidFill>
+                                        <a:latin typeface="Cambria Math" panose="02040503050406030204" pitchFamily="18" charset="0"/>
+                                      </a:rPr>
+                                      <m:t>𝑅</m:t>
+                                    </m:r>
+                                  </m:e>
+                                </m:sPre>
+                              </m:e>
+                            </m:mr>
+                            <m:mr>
+                              <m:e/>
+                            </m:mr>
+                            <m:mr>
+                              <m:e>
+                                <m:r>
+                                  <a:rPr lang="en-US" b="0" i="1" smtClean="0">
+                                    <a:solidFill>
+                                      <a:schemeClr val="tx1"/>
+                                    </a:solidFill>
+                                    <a:latin typeface="Cambria Math" panose="02040503050406030204" pitchFamily="18" charset="0"/>
+                                  </a:rPr>
+                                  <m:t>0</m:t>
+                                </m:r>
+                              </m:e>
+                            </m:mr>
+                          </m:m>
+                          <m:m>
+                            <m:mPr>
+                              <m:mcs>
+                                <m:mc>
+                                  <m:mcPr>
+                                    <m:count m:val="1"/>
+                                    <m:mcJc m:val="center"/>
+                                  </m:mcPr>
+                                </m:mc>
+                              </m:mcs>
+                              <m:ctrlPr>
+                                <a:rPr lang="en-US" i="1">
+                                  <a:solidFill>
+                                    <a:schemeClr val="tx1"/>
+                                  </a:solidFill>
+                                  <a:latin typeface="Cambria Math" panose="02040503050406030204" pitchFamily="18" charset="0"/>
+                                </a:rPr>
+                              </m:ctrlPr>
+                            </m:mPr>
+                            <m:mr>
+                              <m:e/>
+                            </m:mr>
+                            <m:mr>
+                              <m:e/>
+                            </m:mr>
+                            <m:mr>
+                              <m:e/>
+                            </m:mr>
+                            <m:mr>
+                              <m:e>
+                                <m:r>
+                                  <a:rPr lang="en-US" b="0" i="1" smtClean="0">
+                                    <a:solidFill>
+                                      <a:schemeClr val="tx1"/>
+                                    </a:solidFill>
+                                    <a:latin typeface="Cambria Math" panose="02040503050406030204" pitchFamily="18" charset="0"/>
+                                  </a:rPr>
+                                  <m:t>0</m:t>
+                                </m:r>
+                              </m:e>
+                            </m:mr>
+                          </m:m>
+                          <m:m>
+                            <m:mPr>
+                              <m:mcs>
+                                <m:mc>
+                                  <m:mcPr>
+                                    <m:count m:val="1"/>
+                                    <m:mcJc m:val="center"/>
+                                  </m:mcPr>
+                                </m:mc>
+                              </m:mcs>
+                              <m:ctrlPr>
+                                <a:rPr lang="en-US" i="1">
+                                  <a:solidFill>
+                                    <a:schemeClr val="tx1"/>
+                                  </a:solidFill>
+                                  <a:latin typeface="Cambria Math" panose="02040503050406030204" pitchFamily="18" charset="0"/>
+                                </a:rPr>
+                              </m:ctrlPr>
+                            </m:mPr>
+                            <m:mr>
+                              <m:e/>
+                            </m:mr>
+                            <m:mr>
+                              <m:e>
+                                <m:sSub>
+                                  <m:sSubPr>
+                                    <m:ctrlPr>
+                                      <a:rPr lang="en-US" b="0" i="1" smtClean="0">
+                                        <a:solidFill>
+                                          <a:schemeClr val="tx1"/>
+                                        </a:solidFill>
+                                        <a:latin typeface="Cambria Math" panose="02040503050406030204" pitchFamily="18" charset="0"/>
+                                      </a:rPr>
+                                    </m:ctrlPr>
+                                  </m:sSubPr>
+                                  <m:e>
+                                    <m:sPre>
+                                      <m:sPrePr>
+                                        <m:ctrlPr>
+                                          <a:rPr lang="en-US" b="0" i="1" smtClean="0">
+                                            <a:solidFill>
+                                              <a:schemeClr val="tx1"/>
+                                            </a:solidFill>
+                                            <a:latin typeface="Cambria Math" panose="02040503050406030204" pitchFamily="18" charset="0"/>
+                                          </a:rPr>
+                                        </m:ctrlPr>
+                                      </m:sPrePr>
+                                      <m:sub/>
+                                      <m:sup>
+                                        <m:r>
+                                          <a:rPr lang="en-US" b="0" i="1" smtClean="0">
+                                            <a:solidFill>
+                                              <a:schemeClr val="tx1"/>
+                                            </a:solidFill>
+                                            <a:latin typeface="Cambria Math" panose="02040503050406030204" pitchFamily="18" charset="0"/>
+                                          </a:rPr>
+                                          <m:t>𝐴</m:t>
+                                        </m:r>
+                                      </m:sup>
+                                      <m:e>
+                                        <m:r>
+                                          <a:rPr lang="en-US" b="0" i="1" smtClean="0">
+                                            <a:solidFill>
+                                              <a:schemeClr val="tx1"/>
+                                            </a:solidFill>
+                                            <a:latin typeface="Cambria Math" panose="02040503050406030204" pitchFamily="18" charset="0"/>
+                                          </a:rPr>
+                                          <m:t>𝑃</m:t>
+                                        </m:r>
+                                      </m:e>
+                                    </m:sPre>
+                                  </m:e>
+                                  <m:sub>
+                                    <m:r>
+                                      <a:rPr lang="en-US" b="0" i="1" smtClean="0">
+                                        <a:solidFill>
+                                          <a:schemeClr val="tx1"/>
+                                        </a:solidFill>
+                                        <a:latin typeface="Cambria Math" panose="02040503050406030204" pitchFamily="18" charset="0"/>
+                                      </a:rPr>
+                                      <m:t>𝐵𝑂𝑅𝐺</m:t>
+                                    </m:r>
+                                  </m:sub>
+                                </m:sSub>
+                              </m:e>
+                            </m:mr>
+                            <m:mr>
+                              <m:e/>
+                            </m:mr>
+                            <m:mr>
+                              <m:e>
+                                <m:r>
+                                  <a:rPr lang="en-US" b="0" i="1" smtClean="0">
+                                    <a:solidFill>
+                                      <a:schemeClr val="tx1"/>
+                                    </a:solidFill>
+                                    <a:latin typeface="Cambria Math" panose="02040503050406030204" pitchFamily="18" charset="0"/>
+                                  </a:rPr>
+                                  <m:t>1</m:t>
+                                </m:r>
+                              </m:e>
+                            </m:mr>
+                          </m:m>
+                        </m:e>
+                      </m:d>
+                      <m:d>
+                        <m:dPr>
+                          <m:begChr m:val="["/>
+                          <m:endChr m:val="]"/>
+                          <m:ctrlPr>
+                            <a:rPr lang="en-US" i="1">
+                              <a:solidFill>
+                                <a:schemeClr val="tx1"/>
+                              </a:solidFill>
+                              <a:latin typeface="Cambria Math" panose="02040503050406030204" pitchFamily="18" charset="0"/>
+                            </a:rPr>
+                          </m:ctrlPr>
+                        </m:dPr>
+                        <m:e>
+                          <m:m>
+                            <m:mPr>
+                              <m:mcs>
+                                <m:mc>
+                                  <m:mcPr>
+                                    <m:count m:val="1"/>
+                                    <m:mcJc m:val="center"/>
+                                  </m:mcPr>
+                                </m:mc>
+                              </m:mcs>
+                              <m:ctrlPr>
+                                <a:rPr lang="en-US" i="1">
+                                  <a:solidFill>
+                                    <a:schemeClr val="tx1"/>
+                                  </a:solidFill>
+                                  <a:latin typeface="Cambria Math" panose="02040503050406030204" pitchFamily="18" charset="0"/>
+                                </a:rPr>
+                              </m:ctrlPr>
+                            </m:mPr>
+                            <m:mr>
+                              <m:e/>
+                            </m:mr>
+                            <m:mr>
+                              <m:e>
+                                <m:sPre>
+                                  <m:sPrePr>
+                                    <m:ctrlPr>
+                                      <a:rPr lang="en-US" i="1">
+                                        <a:solidFill>
+                                          <a:schemeClr val="tx1"/>
+                                        </a:solidFill>
+                                        <a:latin typeface="Cambria Math" panose="02040503050406030204" pitchFamily="18" charset="0"/>
+                                      </a:rPr>
+                                    </m:ctrlPr>
+                                  </m:sPrePr>
+                                  <m:sub/>
+                                  <m:sup>
+                                    <m:r>
+                                      <a:rPr lang="en-US" b="0" i="1" smtClean="0">
+                                        <a:solidFill>
+                                          <a:schemeClr val="tx1"/>
+                                        </a:solidFill>
+                                        <a:latin typeface="Cambria Math" panose="02040503050406030204" pitchFamily="18" charset="0"/>
+                                      </a:rPr>
+                                      <m:t>𝐵</m:t>
+                                    </m:r>
+                                  </m:sup>
+                                  <m:e>
+                                    <m:r>
+                                      <a:rPr lang="en-US" i="1">
+                                        <a:solidFill>
+                                          <a:schemeClr val="tx1"/>
+                                        </a:solidFill>
+                                        <a:latin typeface="Cambria Math" panose="02040503050406030204" pitchFamily="18" charset="0"/>
+                                      </a:rPr>
+                                      <m:t>𝑃</m:t>
+                                    </m:r>
+                                  </m:e>
+                                </m:sPre>
+                              </m:e>
+                            </m:mr>
+                            <m:mr>
+                              <m:e/>
+                            </m:mr>
+                            <m:mr>
+                              <m:e>
+                                <m:r>
+                                  <a:rPr lang="en-US" i="1">
+                                    <a:solidFill>
+                                      <a:schemeClr val="tx1"/>
+                                    </a:solidFill>
+                                    <a:latin typeface="Cambria Math" panose="02040503050406030204" pitchFamily="18" charset="0"/>
+                                  </a:rPr>
+                                  <m:t>1</m:t>
+                                </m:r>
+                              </m:e>
+                            </m:mr>
+                          </m:m>
+                        </m:e>
+                      </m:d>
+                    </m:oMath>
+                  </m:oMathPara>
+                </a14:m>
+                <a:endParaRPr lang="en-US" dirty="0" smtClean="0">
+                  <a:solidFill>
+                    <a:schemeClr val="tx1"/>
+                  </a:solidFill>
+                </a:endParaRPr>
+              </a:p>
+            </p:txBody>
+          </p:sp>
+        </mc:Choice>
+        <mc:Fallback>
+          <p:sp>
+            <p:nvSpPr>
+              <p:cNvPr id="3" name="Content Placeholder 2"/>
+              <p:cNvSpPr>
+                <a:spLocks noGrp="1" noRot="1" noChangeAspect="1" noMove="1" noResize="1" noEditPoints="1" noAdjustHandles="1" noChangeArrowheads="1" noChangeShapeType="1" noTextEdit="1"/>
+              </p:cNvSpPr>
+              <p:nvPr>
+                <p:ph idx="1"/>
+              </p:nvPr>
+            </p:nvSpPr>
+            <p:spPr>
+              <a:blipFill rotWithShape="0">
+                <a:blip r:embed="rId2"/>
+                <a:stretch>
+                  <a:fillRect l="-1455" t="-1667"/>
+                </a:stretch>
+              </a:blipFill>
+            </p:spPr>
+            <p:txBody>
+              <a:bodyPr/>
+              <a:lstStyle/>
+              <a:p>
+                <a:r>
+                  <a:rPr lang="en-US">
+                    <a:noFill/>
+                  </a:rPr>
+                  <a:t> </a:t>
+                </a:r>
+              </a:p>
+            </p:txBody>
+          </p:sp>
+        </mc:Fallback>
+      </mc:AlternateContent>
       <p:sp>
         <p:nvSpPr>
           <p:cNvPr id="4" name="Slide Number Placeholder 3"/>
@@ -5174,6 +7699,13 @@
   <p:clrMapOvr>
     <a:masterClrMapping/>
   </p:clrMapOvr>
+  <p:timing>
+    <p:tnLst>
+      <p:par>
+        <p:cTn id="1" dur="indefinite" restart="never" nodeType="tmRoot"/>
+      </p:par>
+    </p:tnLst>
+  </p:timing>
 </p:sld>
 </file>
 
@@ -5209,45 +7741,862 @@
           <a:bodyPr/>
           <a:lstStyle/>
           <a:p>
-            <a:endParaRPr lang="en-US" dirty="0"/>
-          </a:p>
-        </p:txBody>
-      </p:sp>
-      <p:sp>
-        <p:nvSpPr>
-          <p:cNvPr id="3" name="Content Placeholder 2"/>
-          <p:cNvSpPr>
-            <a:spLocks noGrp="1"/>
-          </p:cNvSpPr>
-          <p:nvPr>
-            <p:ph idx="1"/>
-          </p:nvPr>
-        </p:nvSpPr>
-        <p:spPr/>
-        <p:txBody>
-          <a:bodyPr/>
-          <a:lstStyle/>
-          <a:p>
-            <a:pPr>
-              <a:buFont typeface="Arial" panose="020B0604020202020204" pitchFamily="34" charset="0"/>
-              <a:buChar char="•"/>
-            </a:pPr>
             <a:r>
-              <a:rPr lang="en-US" dirty="0" smtClean="0">
-                <a:solidFill>
-                  <a:schemeClr val="tx1"/>
-                </a:solidFill>
-              </a:rPr>
-              <a:t> V</a:t>
+              <a:rPr lang="en-US" dirty="0"/>
+              <a:t>Compound Transformations</a:t>
             </a:r>
-            <a:endParaRPr lang="en-US" dirty="0">
-              <a:solidFill>
-                <a:schemeClr val="tx1"/>
-              </a:solidFill>
-            </a:endParaRPr>
-          </a:p>
-        </p:txBody>
-      </p:sp>
+          </a:p>
+        </p:txBody>
+      </p:sp>
+      <mc:AlternateContent xmlns:mc="http://schemas.openxmlformats.org/markup-compatibility/2006">
+        <mc:Choice xmlns:a14="http://schemas.microsoft.com/office/drawing/2010/main" Requires="a14">
+          <p:sp>
+            <p:nvSpPr>
+              <p:cNvPr id="3" name="Content Placeholder 2"/>
+              <p:cNvSpPr>
+                <a:spLocks noGrp="1"/>
+              </p:cNvSpPr>
+              <p:nvPr>
+                <p:ph idx="1"/>
+              </p:nvPr>
+            </p:nvSpPr>
+            <p:spPr/>
+            <p:txBody>
+              <a:bodyPr/>
+              <a:lstStyle/>
+              <a:p>
+                <a:pPr>
+                  <a:buFont typeface="Arial" panose="020B0604020202020204" pitchFamily="34" charset="0"/>
+                  <a:buChar char="•"/>
+                </a:pPr>
+                <a:r>
+                  <a:rPr lang="en-US" dirty="0" smtClean="0">
+                    <a:solidFill>
+                      <a:schemeClr val="tx1"/>
+                    </a:solidFill>
+                  </a:rPr>
+                  <a:t> If we have many transformation then the </a:t>
+                </a:r>
+                <a:r>
+                  <a:rPr lang="en-US" dirty="0">
+                    <a:solidFill>
+                      <a:schemeClr val="tx1"/>
+                    </a:solidFill>
+                  </a:rPr>
+                  <a:t>position of the point expressed in </a:t>
+                </a:r>
+                <a:r>
+                  <a:rPr lang="en-US" dirty="0" smtClean="0">
+                    <a:solidFill>
+                      <a:schemeClr val="tx1"/>
+                    </a:solidFill>
+                  </a:rPr>
+                  <a:t>the last frame “C” </a:t>
+                </a:r>
+                <a:r>
+                  <a:rPr lang="en-US" dirty="0">
+                    <a:solidFill>
+                      <a:schemeClr val="tx1"/>
+                    </a:solidFill>
+                  </a:rPr>
+                  <a:t>can be expressed in frame “A” as follows: </a:t>
+                </a:r>
+                <a14:m>
+                  <m:oMath xmlns:m="http://schemas.openxmlformats.org/officeDocument/2006/math">
+                    <m:sPre>
+                      <m:sPrePr>
+                        <m:ctrlPr>
+                          <a:rPr lang="en-US" i="1">
+                            <a:solidFill>
+                              <a:schemeClr val="tx1"/>
+                            </a:solidFill>
+                            <a:latin typeface="Cambria Math" panose="02040503050406030204" pitchFamily="18" charset="0"/>
+                          </a:rPr>
+                        </m:ctrlPr>
+                      </m:sPrePr>
+                      <m:sub/>
+                      <m:sup>
+                        <m:r>
+                          <a:rPr lang="en-US" b="0" i="1" smtClean="0">
+                            <a:solidFill>
+                              <a:schemeClr val="tx1"/>
+                            </a:solidFill>
+                            <a:latin typeface="Cambria Math" panose="02040503050406030204" pitchFamily="18" charset="0"/>
+                          </a:rPr>
+                          <m:t>𝐴</m:t>
+                        </m:r>
+                      </m:sup>
+                      <m:e>
+                        <m:r>
+                          <a:rPr lang="en-US" i="1">
+                            <a:solidFill>
+                              <a:schemeClr val="tx1"/>
+                            </a:solidFill>
+                            <a:latin typeface="Cambria Math" panose="02040503050406030204" pitchFamily="18" charset="0"/>
+                          </a:rPr>
+                          <m:t>𝑃</m:t>
+                        </m:r>
+                      </m:e>
+                    </m:sPre>
+                    <m:r>
+                      <a:rPr lang="en-US" b="0" i="1" smtClean="0">
+                        <a:solidFill>
+                          <a:schemeClr val="tx1"/>
+                        </a:solidFill>
+                        <a:latin typeface="Cambria Math" panose="02040503050406030204" pitchFamily="18" charset="0"/>
+                      </a:rPr>
+                      <m:t>=</m:t>
+                    </m:r>
+                    <m:sPre>
+                      <m:sPrePr>
+                        <m:ctrlPr>
+                          <a:rPr lang="en-US" i="1">
+                            <a:solidFill>
+                              <a:schemeClr val="tx1"/>
+                            </a:solidFill>
+                            <a:latin typeface="Cambria Math" panose="02040503050406030204" pitchFamily="18" charset="0"/>
+                          </a:rPr>
+                        </m:ctrlPr>
+                      </m:sPrePr>
+                      <m:sub>
+                        <m:r>
+                          <a:rPr lang="en-US" i="1">
+                            <a:solidFill>
+                              <a:schemeClr val="tx1"/>
+                            </a:solidFill>
+                            <a:latin typeface="Cambria Math" panose="02040503050406030204" pitchFamily="18" charset="0"/>
+                          </a:rPr>
+                          <m:t>𝐵</m:t>
+                        </m:r>
+                      </m:sub>
+                      <m:sup>
+                        <m:r>
+                          <a:rPr lang="en-US" i="1">
+                            <a:solidFill>
+                              <a:schemeClr val="tx1"/>
+                            </a:solidFill>
+                            <a:latin typeface="Cambria Math" panose="02040503050406030204" pitchFamily="18" charset="0"/>
+                          </a:rPr>
+                          <m:t>𝐴</m:t>
+                        </m:r>
+                      </m:sup>
+                      <m:e>
+                        <m:r>
+                          <a:rPr lang="en-US" i="1">
+                            <a:solidFill>
+                              <a:schemeClr val="tx1"/>
+                            </a:solidFill>
+                            <a:latin typeface="Cambria Math" panose="02040503050406030204" pitchFamily="18" charset="0"/>
+                          </a:rPr>
+                          <m:t>𝑇</m:t>
+                        </m:r>
+                      </m:e>
+                    </m:sPre>
+                    <m:sPre>
+                      <m:sPrePr>
+                        <m:ctrlPr>
+                          <a:rPr lang="en-US" i="1">
+                            <a:solidFill>
+                              <a:schemeClr val="tx1"/>
+                            </a:solidFill>
+                            <a:latin typeface="Cambria Math" panose="02040503050406030204" pitchFamily="18" charset="0"/>
+                          </a:rPr>
+                        </m:ctrlPr>
+                      </m:sPrePr>
+                      <m:sub>
+                        <m:r>
+                          <a:rPr lang="en-US" b="0" i="1" smtClean="0">
+                            <a:solidFill>
+                              <a:schemeClr val="tx1"/>
+                            </a:solidFill>
+                            <a:latin typeface="Cambria Math" panose="02040503050406030204" pitchFamily="18" charset="0"/>
+                          </a:rPr>
+                          <m:t>𝐶</m:t>
+                        </m:r>
+                      </m:sub>
+                      <m:sup>
+                        <m:r>
+                          <a:rPr lang="en-US" b="0" i="1" smtClean="0">
+                            <a:solidFill>
+                              <a:schemeClr val="tx1"/>
+                            </a:solidFill>
+                            <a:latin typeface="Cambria Math" panose="02040503050406030204" pitchFamily="18" charset="0"/>
+                          </a:rPr>
+                          <m:t>𝐵</m:t>
+                        </m:r>
+                      </m:sup>
+                      <m:e>
+                        <m:r>
+                          <a:rPr lang="en-US" i="1">
+                            <a:solidFill>
+                              <a:schemeClr val="tx1"/>
+                            </a:solidFill>
+                            <a:latin typeface="Cambria Math" panose="02040503050406030204" pitchFamily="18" charset="0"/>
+                          </a:rPr>
+                          <m:t>𝑇</m:t>
+                        </m:r>
+                      </m:e>
+                    </m:sPre>
+                    <m:sPre>
+                      <m:sPrePr>
+                        <m:ctrlPr>
+                          <a:rPr lang="en-US" i="1">
+                            <a:solidFill>
+                              <a:schemeClr val="tx1"/>
+                            </a:solidFill>
+                            <a:latin typeface="Cambria Math" panose="02040503050406030204" pitchFamily="18" charset="0"/>
+                          </a:rPr>
+                        </m:ctrlPr>
+                      </m:sPrePr>
+                      <m:sub/>
+                      <m:sup>
+                        <m:r>
+                          <a:rPr lang="en-US" b="0" i="1" smtClean="0">
+                            <a:solidFill>
+                              <a:schemeClr val="tx1"/>
+                            </a:solidFill>
+                            <a:latin typeface="Cambria Math" panose="02040503050406030204" pitchFamily="18" charset="0"/>
+                          </a:rPr>
+                          <m:t>𝐶</m:t>
+                        </m:r>
+                      </m:sup>
+                      <m:e>
+                        <m:r>
+                          <a:rPr lang="en-US" i="1">
+                            <a:solidFill>
+                              <a:schemeClr val="tx1"/>
+                            </a:solidFill>
+                            <a:latin typeface="Cambria Math" panose="02040503050406030204" pitchFamily="18" charset="0"/>
+                          </a:rPr>
+                          <m:t>𝑃</m:t>
+                        </m:r>
+                      </m:e>
+                    </m:sPre>
+                  </m:oMath>
+                </a14:m>
+                <a:endParaRPr lang="en-US" dirty="0" smtClean="0">
+                  <a:solidFill>
+                    <a:schemeClr val="tx1"/>
+                  </a:solidFill>
+                </a:endParaRPr>
+              </a:p>
+              <a:p>
+                <a:pPr>
+                  <a:buFont typeface="Arial" panose="020B0604020202020204" pitchFamily="34" charset="0"/>
+                  <a:buChar char="•"/>
+                </a:pPr>
+                <a:r>
+                  <a:rPr lang="en-US" dirty="0">
+                    <a:solidFill>
+                      <a:schemeClr val="tx1"/>
+                    </a:solidFill>
+                  </a:rPr>
+                  <a:t>  It must be noted that the </a:t>
+                </a:r>
+                <a:r>
+                  <a:rPr lang="en-US" dirty="0" smtClean="0">
+                    <a:solidFill>
+                      <a:schemeClr val="tx1"/>
+                    </a:solidFill>
+                  </a:rPr>
+                  <a:t>inverse of a transformation matrix is as follow: </a:t>
+                </a:r>
+                <a14:m>
+                  <m:oMath xmlns:m="http://schemas.openxmlformats.org/officeDocument/2006/math">
+                    <m:sPre>
+                      <m:sPrePr>
+                        <m:ctrlPr>
+                          <a:rPr lang="en-US" i="1">
+                            <a:solidFill>
+                              <a:schemeClr val="tx1"/>
+                            </a:solidFill>
+                            <a:latin typeface="Cambria Math" panose="02040503050406030204" pitchFamily="18" charset="0"/>
+                          </a:rPr>
+                        </m:ctrlPr>
+                      </m:sPrePr>
+                      <m:sub>
+                        <m:r>
+                          <a:rPr lang="en-US" b="0" i="1" smtClean="0">
+                            <a:solidFill>
+                              <a:schemeClr val="tx1"/>
+                            </a:solidFill>
+                            <a:latin typeface="Cambria Math" panose="02040503050406030204" pitchFamily="18" charset="0"/>
+                          </a:rPr>
+                          <m:t>𝐴</m:t>
+                        </m:r>
+                      </m:sub>
+                      <m:sup>
+                        <m:r>
+                          <a:rPr lang="en-US" b="0" i="1" smtClean="0">
+                            <a:latin typeface="Cambria Math" panose="02040503050406030204" pitchFamily="18" charset="0"/>
+                          </a:rPr>
+                          <m:t>𝐵</m:t>
+                        </m:r>
+                      </m:sup>
+                      <m:e>
+                        <m:r>
+                          <a:rPr lang="en-US" b="0" i="1" smtClean="0">
+                            <a:latin typeface="Cambria Math" panose="02040503050406030204" pitchFamily="18" charset="0"/>
+                          </a:rPr>
+                          <m:t>𝑇</m:t>
+                        </m:r>
+                      </m:e>
+                    </m:sPre>
+                    <m:r>
+                      <a:rPr lang="en-US" i="1">
+                        <a:latin typeface="Cambria Math" panose="02040503050406030204" pitchFamily="18" charset="0"/>
+                      </a:rPr>
+                      <m:t>=</m:t>
+                    </m:r>
+                    <m:sPre>
+                      <m:sPrePr>
+                        <m:ctrlPr>
+                          <a:rPr lang="en-US" i="1">
+                            <a:solidFill>
+                              <a:schemeClr val="tx1"/>
+                            </a:solidFill>
+                            <a:latin typeface="Cambria Math" panose="02040503050406030204" pitchFamily="18" charset="0"/>
+                          </a:rPr>
+                        </m:ctrlPr>
+                      </m:sPrePr>
+                      <m:sub>
+                        <m:r>
+                          <a:rPr lang="en-US" b="0" i="1" smtClean="0">
+                            <a:solidFill>
+                              <a:schemeClr val="tx1"/>
+                            </a:solidFill>
+                            <a:latin typeface="Cambria Math" panose="02040503050406030204" pitchFamily="18" charset="0"/>
+                          </a:rPr>
+                          <m:t>𝐵</m:t>
+                        </m:r>
+                      </m:sub>
+                      <m:sup>
+                        <m:r>
+                          <a:rPr lang="en-US" b="0" i="1" smtClean="0">
+                            <a:solidFill>
+                              <a:schemeClr val="tx1"/>
+                            </a:solidFill>
+                            <a:latin typeface="Cambria Math" panose="02040503050406030204" pitchFamily="18" charset="0"/>
+                          </a:rPr>
+                          <m:t>𝐴</m:t>
+                        </m:r>
+                      </m:sup>
+                      <m:e>
+                        <m:sSup>
+                          <m:sSupPr>
+                            <m:ctrlPr>
+                              <a:rPr lang="en-US" i="1">
+                                <a:solidFill>
+                                  <a:schemeClr val="tx1"/>
+                                </a:solidFill>
+                                <a:latin typeface="Cambria Math" panose="02040503050406030204" pitchFamily="18" charset="0"/>
+                              </a:rPr>
+                            </m:ctrlPr>
+                          </m:sSupPr>
+                          <m:e>
+                            <m:r>
+                              <a:rPr lang="en-US" b="0" i="1" smtClean="0">
+                                <a:solidFill>
+                                  <a:schemeClr val="tx1"/>
+                                </a:solidFill>
+                                <a:latin typeface="Cambria Math" panose="02040503050406030204" pitchFamily="18" charset="0"/>
+                              </a:rPr>
+                              <m:t>𝑇</m:t>
+                            </m:r>
+                          </m:e>
+                          <m:sup>
+                            <m:r>
+                              <a:rPr lang="en-US" i="1">
+                                <a:solidFill>
+                                  <a:schemeClr val="tx1"/>
+                                </a:solidFill>
+                                <a:latin typeface="Cambria Math" panose="02040503050406030204" pitchFamily="18" charset="0"/>
+                              </a:rPr>
+                              <m:t>−1</m:t>
+                            </m:r>
+                          </m:sup>
+                        </m:sSup>
+                      </m:e>
+                    </m:sPre>
+                  </m:oMath>
+                </a14:m>
+                <a:endParaRPr lang="en-US" dirty="0" smtClean="0">
+                  <a:solidFill>
+                    <a:schemeClr val="tx1"/>
+                  </a:solidFill>
+                </a:endParaRPr>
+              </a:p>
+              <a:p>
+                <a:pPr>
+                  <a:buFont typeface="Arial" panose="020B0604020202020204" pitchFamily="34" charset="0"/>
+                  <a:buChar char="•"/>
+                </a:pPr>
+                <a:r>
+                  <a:rPr lang="en-US" dirty="0" smtClean="0">
+                    <a:solidFill>
+                      <a:schemeClr val="tx1"/>
+                    </a:solidFill>
+                  </a:rPr>
+                  <a:t> For a compound transformation we can use either:</a:t>
+                </a:r>
+              </a:p>
+              <a:p>
+                <a:pPr lvl="1">
+                  <a:buFont typeface="Wingdings" panose="05000000000000000000" pitchFamily="2" charset="2"/>
+                  <a:buChar char="Ø"/>
+                </a:pPr>
+                <a:r>
+                  <a:rPr lang="en-US" dirty="0" smtClean="0">
+                    <a:solidFill>
+                      <a:schemeClr val="tx1"/>
+                    </a:solidFill>
+                  </a:rPr>
+                  <a:t> Fixed angle which rotations performs about an axis of a fixed reference frame</a:t>
+                </a:r>
+              </a:p>
+              <a:p>
+                <a:pPr lvl="1">
+                  <a:buFont typeface="Wingdings" panose="05000000000000000000" pitchFamily="2" charset="2"/>
+                  <a:buChar char="Ø"/>
+                </a:pPr>
+                <a:r>
+                  <a:rPr lang="en-US" dirty="0" smtClean="0">
+                    <a:solidFill>
+                      <a:schemeClr val="tx1"/>
+                    </a:solidFill>
+                  </a:rPr>
+                  <a:t>Euler angles </a:t>
+                </a:r>
+                <a:r>
+                  <a:rPr lang="en-US" dirty="0">
+                    <a:solidFill>
+                      <a:schemeClr val="tx1"/>
+                    </a:solidFill>
+                  </a:rPr>
+                  <a:t>which rotations performs about an axis of a </a:t>
+                </a:r>
+                <a:r>
+                  <a:rPr lang="en-US" dirty="0" smtClean="0">
+                    <a:solidFill>
+                      <a:schemeClr val="tx1"/>
+                    </a:solidFill>
+                  </a:rPr>
+                  <a:t>moving reference frame</a:t>
+                </a:r>
+              </a:p>
+              <a:p>
+                <a:pPr>
+                  <a:buFont typeface="Arial" panose="020B0604020202020204" pitchFamily="34" charset="0"/>
+                  <a:buChar char="•"/>
+                </a:pPr>
+                <a:r>
+                  <a:rPr lang="en-US" dirty="0" smtClean="0">
+                    <a:solidFill>
+                      <a:schemeClr val="tx1"/>
+                    </a:solidFill>
+                  </a:rPr>
+                  <a:t> The relationship between fixed angle and Euler angle is as follow:</a:t>
+                </a:r>
+              </a:p>
+              <a:p>
+                <a:pPr marL="0" indent="0">
+                  <a:buNone/>
+                </a:pPr>
+                <a14:m>
+                  <m:oMathPara xmlns:m="http://schemas.openxmlformats.org/officeDocument/2006/math">
+                    <m:oMathParaPr>
+                      <m:jc m:val="centerGroup"/>
+                    </m:oMathParaPr>
+                    <m:oMath xmlns:m="http://schemas.openxmlformats.org/officeDocument/2006/math">
+                      <m:sPre>
+                        <m:sPrePr>
+                          <m:ctrlPr>
+                            <a:rPr lang="en-US" i="1" smtClean="0">
+                              <a:solidFill>
+                                <a:schemeClr val="tx1"/>
+                              </a:solidFill>
+                              <a:latin typeface="Cambria Math" panose="02040503050406030204" pitchFamily="18" charset="0"/>
+                            </a:rPr>
+                          </m:ctrlPr>
+                        </m:sPrePr>
+                        <m:sub>
+                          <m:r>
+                            <a:rPr lang="en-US" b="0" i="1" smtClean="0">
+                              <a:solidFill>
+                                <a:schemeClr val="tx1"/>
+                              </a:solidFill>
+                              <a:latin typeface="Cambria Math" panose="02040503050406030204" pitchFamily="18" charset="0"/>
+                            </a:rPr>
+                            <m:t>𝐵</m:t>
+                          </m:r>
+                        </m:sub>
+                        <m:sup>
+                          <m:r>
+                            <a:rPr lang="en-US" b="0" i="1" smtClean="0">
+                              <a:latin typeface="Cambria Math" panose="02040503050406030204" pitchFamily="18" charset="0"/>
+                            </a:rPr>
+                            <m:t>𝐴</m:t>
+                          </m:r>
+                        </m:sup>
+                        <m:e>
+                          <m:sSub>
+                            <m:sSubPr>
+                              <m:ctrlPr>
+                                <a:rPr lang="en-US" b="0" i="1" smtClean="0">
+                                  <a:latin typeface="Cambria Math" panose="02040503050406030204" pitchFamily="18" charset="0"/>
+                                </a:rPr>
+                              </m:ctrlPr>
+                            </m:sSubPr>
+                            <m:e>
+                              <m:r>
+                                <a:rPr lang="en-US" b="0" i="1" smtClean="0">
+                                  <a:latin typeface="Cambria Math" panose="02040503050406030204" pitchFamily="18" charset="0"/>
+                                </a:rPr>
+                                <m:t>𝑅</m:t>
+                              </m:r>
+                            </m:e>
+                            <m:sub>
+                              <m:r>
+                                <a:rPr lang="en-US" b="0" i="1" smtClean="0">
+                                  <a:latin typeface="Cambria Math" panose="02040503050406030204" pitchFamily="18" charset="0"/>
+                                </a:rPr>
+                                <m:t>𝑋𝑌𝑍</m:t>
+                              </m:r>
+                            </m:sub>
+                          </m:sSub>
+                          <m:d>
+                            <m:dPr>
+                              <m:ctrlPr>
+                                <a:rPr lang="en-US" b="0" i="1" smtClean="0">
+                                  <a:latin typeface="Cambria Math" panose="02040503050406030204" pitchFamily="18" charset="0"/>
+                                </a:rPr>
+                              </m:ctrlPr>
+                            </m:dPr>
+                            <m:e>
+                              <m:r>
+                                <a:rPr lang="en-US" b="0" i="1" smtClean="0">
+                                  <a:latin typeface="Cambria Math" panose="02040503050406030204" pitchFamily="18" charset="0"/>
+                                </a:rPr>
+                                <m:t>𝛾</m:t>
+                              </m:r>
+                              <m:r>
+                                <a:rPr lang="en-US" b="0" i="1" smtClean="0">
+                                  <a:latin typeface="Cambria Math" panose="02040503050406030204" pitchFamily="18" charset="0"/>
+                                </a:rPr>
+                                <m:t>,</m:t>
+                              </m:r>
+                              <m:r>
+                                <a:rPr lang="en-US" b="0" i="1" smtClean="0">
+                                  <a:latin typeface="Cambria Math" panose="02040503050406030204" pitchFamily="18" charset="0"/>
+                                </a:rPr>
+                                <m:t>𝛽</m:t>
+                              </m:r>
+                              <m:r>
+                                <a:rPr lang="en-US" b="0" i="1" smtClean="0">
+                                  <a:latin typeface="Cambria Math" panose="02040503050406030204" pitchFamily="18" charset="0"/>
+                                </a:rPr>
+                                <m:t>,</m:t>
+                              </m:r>
+                              <m:r>
+                                <a:rPr lang="en-US" b="0" i="1" smtClean="0">
+                                  <a:latin typeface="Cambria Math" panose="02040503050406030204" pitchFamily="18" charset="0"/>
+                                </a:rPr>
+                                <m:t>𝛼</m:t>
+                              </m:r>
+                            </m:e>
+                          </m:d>
+                          <m:r>
+                            <a:rPr lang="en-US" b="0" i="1" smtClean="0">
+                              <a:latin typeface="Cambria Math" panose="02040503050406030204" pitchFamily="18" charset="0"/>
+                            </a:rPr>
+                            <m:t>=</m:t>
+                          </m:r>
+                          <m:sPre>
+                            <m:sPrePr>
+                              <m:ctrlPr>
+                                <a:rPr lang="en-US" i="1">
+                                  <a:solidFill>
+                                    <a:schemeClr val="tx1"/>
+                                  </a:solidFill>
+                                  <a:latin typeface="Cambria Math" panose="02040503050406030204" pitchFamily="18" charset="0"/>
+                                </a:rPr>
+                              </m:ctrlPr>
+                            </m:sPrePr>
+                            <m:sub>
+                              <m:r>
+                                <a:rPr lang="en-US" b="0" i="1" smtClean="0">
+                                  <a:solidFill>
+                                    <a:schemeClr val="tx1"/>
+                                  </a:solidFill>
+                                  <a:latin typeface="Cambria Math" panose="02040503050406030204" pitchFamily="18" charset="0"/>
+                                </a:rPr>
+                                <m:t>𝐵</m:t>
+                              </m:r>
+                            </m:sub>
+                            <m:sup>
+                              <m:r>
+                                <a:rPr lang="en-US" b="0" i="1" smtClean="0">
+                                  <a:solidFill>
+                                    <a:schemeClr val="tx1"/>
+                                  </a:solidFill>
+                                  <a:latin typeface="Cambria Math" panose="02040503050406030204" pitchFamily="18" charset="0"/>
+                                </a:rPr>
+                                <m:t>𝐴</m:t>
+                              </m:r>
+                            </m:sup>
+                            <m:e>
+                              <m:sSubSup>
+                                <m:sSubSupPr>
+                                  <m:ctrlPr>
+                                    <a:rPr lang="en-US" b="0" i="1" smtClean="0">
+                                      <a:solidFill>
+                                        <a:schemeClr val="tx1"/>
+                                      </a:solidFill>
+                                      <a:latin typeface="Cambria Math" panose="02040503050406030204" pitchFamily="18" charset="0"/>
+                                    </a:rPr>
+                                  </m:ctrlPr>
+                                </m:sSubSupPr>
+                                <m:e>
+                                  <m:r>
+                                    <a:rPr lang="en-US" b="0" i="1" smtClean="0">
+                                      <a:solidFill>
+                                        <a:schemeClr val="tx1"/>
+                                      </a:solidFill>
+                                      <a:latin typeface="Cambria Math" panose="02040503050406030204" pitchFamily="18" charset="0"/>
+                                    </a:rPr>
+                                    <m:t>𝑅</m:t>
+                                  </m:r>
+                                </m:e>
+                                <m:sub>
+                                  <m:sSup>
+                                    <m:sSupPr>
+                                      <m:ctrlPr>
+                                        <a:rPr lang="en-US" b="0" i="1" smtClean="0">
+                                          <a:solidFill>
+                                            <a:schemeClr val="tx1"/>
+                                          </a:solidFill>
+                                          <a:latin typeface="Cambria Math" panose="02040503050406030204" pitchFamily="18" charset="0"/>
+                                        </a:rPr>
+                                      </m:ctrlPr>
+                                    </m:sSupPr>
+                                    <m:e>
+                                      <m:r>
+                                        <a:rPr lang="en-US" b="0" i="1" smtClean="0">
+                                          <a:solidFill>
+                                            <a:schemeClr val="tx1"/>
+                                          </a:solidFill>
+                                          <a:latin typeface="Cambria Math" panose="02040503050406030204" pitchFamily="18" charset="0"/>
+                                        </a:rPr>
+                                        <m:t>𝑍</m:t>
+                                      </m:r>
+                                    </m:e>
+                                    <m:sup>
+                                      <m:r>
+                                        <a:rPr lang="en-US" b="0" i="1" smtClean="0">
+                                          <a:solidFill>
+                                            <a:schemeClr val="tx1"/>
+                                          </a:solidFill>
+                                          <a:latin typeface="Cambria Math" panose="02040503050406030204" pitchFamily="18" charset="0"/>
+                                        </a:rPr>
+                                        <m:t>′</m:t>
+                                      </m:r>
+                                    </m:sup>
+                                  </m:sSup>
+                                  <m:sSup>
+                                    <m:sSupPr>
+                                      <m:ctrlPr>
+                                        <a:rPr lang="en-US" b="0" i="1" smtClean="0">
+                                          <a:solidFill>
+                                            <a:schemeClr val="tx1"/>
+                                          </a:solidFill>
+                                          <a:latin typeface="Cambria Math" panose="02040503050406030204" pitchFamily="18" charset="0"/>
+                                        </a:rPr>
+                                      </m:ctrlPr>
+                                    </m:sSupPr>
+                                    <m:e>
+                                      <m:r>
+                                        <a:rPr lang="en-US" b="0" i="1" smtClean="0">
+                                          <a:solidFill>
+                                            <a:schemeClr val="tx1"/>
+                                          </a:solidFill>
+                                          <a:latin typeface="Cambria Math" panose="02040503050406030204" pitchFamily="18" charset="0"/>
+                                        </a:rPr>
+                                        <m:t>𝑌</m:t>
+                                      </m:r>
+                                    </m:e>
+                                    <m:sup>
+                                      <m:r>
+                                        <a:rPr lang="en-US" b="0" i="1" smtClean="0">
+                                          <a:solidFill>
+                                            <a:schemeClr val="tx1"/>
+                                          </a:solidFill>
+                                          <a:latin typeface="Cambria Math" panose="02040503050406030204" pitchFamily="18" charset="0"/>
+                                        </a:rPr>
+                                        <m:t>′</m:t>
+                                      </m:r>
+                                    </m:sup>
+                                  </m:sSup>
+                                  <m:sSup>
+                                    <m:sSupPr>
+                                      <m:ctrlPr>
+                                        <a:rPr lang="en-US" b="0" i="1" smtClean="0">
+                                          <a:solidFill>
+                                            <a:schemeClr val="tx1"/>
+                                          </a:solidFill>
+                                          <a:latin typeface="Cambria Math" panose="02040503050406030204" pitchFamily="18" charset="0"/>
+                                        </a:rPr>
+                                      </m:ctrlPr>
+                                    </m:sSupPr>
+                                    <m:e>
+                                      <m:r>
+                                        <a:rPr lang="en-US" b="0" i="1" smtClean="0">
+                                          <a:solidFill>
+                                            <a:schemeClr val="tx1"/>
+                                          </a:solidFill>
+                                          <a:latin typeface="Cambria Math" panose="02040503050406030204" pitchFamily="18" charset="0"/>
+                                        </a:rPr>
+                                        <m:t>𝑋</m:t>
+                                      </m:r>
+                                    </m:e>
+                                    <m:sup>
+                                      <m:r>
+                                        <a:rPr lang="en-US" b="0" i="1" smtClean="0">
+                                          <a:solidFill>
+                                            <a:schemeClr val="tx1"/>
+                                          </a:solidFill>
+                                          <a:latin typeface="Cambria Math" panose="02040503050406030204" pitchFamily="18" charset="0"/>
+                                        </a:rPr>
+                                        <m:t>′</m:t>
+                                      </m:r>
+                                    </m:sup>
+                                  </m:sSup>
+                                </m:sub>
+                                <m:sup/>
+                              </m:sSubSup>
+                              <m:r>
+                                <a:rPr lang="en-US" b="0" i="1" smtClean="0">
+                                  <a:solidFill>
+                                    <a:schemeClr val="tx1"/>
+                                  </a:solidFill>
+                                  <a:latin typeface="Cambria Math" panose="02040503050406030204" pitchFamily="18" charset="0"/>
+                                </a:rPr>
+                                <m:t>(</m:t>
+                              </m:r>
+                              <m:r>
+                                <a:rPr lang="en-US" b="0" i="1" smtClean="0">
+                                  <a:solidFill>
+                                    <a:schemeClr val="tx1"/>
+                                  </a:solidFill>
+                                  <a:latin typeface="Cambria Math" panose="02040503050406030204" pitchFamily="18" charset="0"/>
+                                </a:rPr>
+                                <m:t>𝛼</m:t>
+                              </m:r>
+                              <m:r>
+                                <a:rPr lang="en-US" b="0" i="1" smtClean="0">
+                                  <a:solidFill>
+                                    <a:schemeClr val="tx1"/>
+                                  </a:solidFill>
+                                  <a:latin typeface="Cambria Math" panose="02040503050406030204" pitchFamily="18" charset="0"/>
+                                </a:rPr>
+                                <m:t>,</m:t>
+                              </m:r>
+                              <m:r>
+                                <a:rPr lang="en-US" b="0" i="1" smtClean="0">
+                                  <a:solidFill>
+                                    <a:schemeClr val="tx1"/>
+                                  </a:solidFill>
+                                  <a:latin typeface="Cambria Math" panose="02040503050406030204" pitchFamily="18" charset="0"/>
+                                </a:rPr>
+                                <m:t>𝛽</m:t>
+                              </m:r>
+                              <m:r>
+                                <a:rPr lang="en-US" b="0" i="1" smtClean="0">
+                                  <a:solidFill>
+                                    <a:schemeClr val="tx1"/>
+                                  </a:solidFill>
+                                  <a:latin typeface="Cambria Math" panose="02040503050406030204" pitchFamily="18" charset="0"/>
+                                </a:rPr>
+                                <m:t>,</m:t>
+                              </m:r>
+                              <m:r>
+                                <a:rPr lang="en-US" b="0" i="1" smtClean="0">
+                                  <a:solidFill>
+                                    <a:schemeClr val="tx1"/>
+                                  </a:solidFill>
+                                  <a:latin typeface="Cambria Math" panose="02040503050406030204" pitchFamily="18" charset="0"/>
+                                </a:rPr>
+                                <m:t>𝛾</m:t>
+                              </m:r>
+                              <m:r>
+                                <a:rPr lang="en-US" b="0" i="1" smtClean="0">
+                                  <a:solidFill>
+                                    <a:schemeClr val="tx1"/>
+                                  </a:solidFill>
+                                  <a:latin typeface="Cambria Math" panose="02040503050406030204" pitchFamily="18" charset="0"/>
+                                </a:rPr>
+                                <m:t>)</m:t>
+                              </m:r>
+                            </m:e>
+                          </m:sPre>
+                          <m:r>
+                            <m:rPr>
+                              <m:nor/>
+                            </m:rPr>
+                            <a:rPr lang="en-US" dirty="0">
+                              <a:solidFill>
+                                <a:schemeClr val="tx1"/>
+                              </a:solidFill>
+                            </a:rPr>
+                            <m:t> </m:t>
+                          </m:r>
+                        </m:e>
+                      </m:sPre>
+                    </m:oMath>
+                  </m:oMathPara>
+                </a14:m>
+                <a:endParaRPr lang="en-US" dirty="0" smtClean="0">
+                  <a:solidFill>
+                    <a:schemeClr val="tx1"/>
+                  </a:solidFill>
+                </a:endParaRPr>
+              </a:p>
+            </p:txBody>
+          </p:sp>
+        </mc:Choice>
+        <mc:Fallback>
+          <p:sp>
+            <p:nvSpPr>
+              <p:cNvPr id="3" name="Content Placeholder 2"/>
+              <p:cNvSpPr>
+                <a:spLocks noGrp="1" noRot="1" noChangeAspect="1" noMove="1" noResize="1" noEditPoints="1" noAdjustHandles="1" noChangeArrowheads="1" noChangeShapeType="1" noTextEdit="1"/>
+              </p:cNvSpPr>
+              <p:nvPr>
+                <p:ph idx="1"/>
+              </p:nvPr>
+            </p:nvSpPr>
+            <p:spPr>
+              <a:blipFill rotWithShape="0">
+                <a:blip r:embed="rId2"/>
+                <a:stretch>
+                  <a:fillRect l="-1455" t="-1667"/>
+                </a:stretch>
+              </a:blipFill>
+            </p:spPr>
+            <p:txBody>
+              <a:bodyPr/>
+              <a:lstStyle/>
+              <a:p>
+                <a:r>
+                  <a:rPr lang="en-US">
+                    <a:noFill/>
+                  </a:rPr>
+                  <a:t> </a:t>
+                </a:r>
+              </a:p>
+            </p:txBody>
+          </p:sp>
+        </mc:Fallback>
+      </mc:AlternateContent>
       <p:sp>
         <p:nvSpPr>
           <p:cNvPr id="4" name="Slide Number Placeholder 3"/>
@@ -5281,6 +8630,13 @@
   <p:clrMapOvr>
     <a:masterClrMapping/>
   </p:clrMapOvr>
+  <p:timing>
+    <p:tnLst>
+      <p:par>
+        <p:cTn id="1" dur="indefinite" restart="never" nodeType="tmRoot"/>
+      </p:par>
+    </p:tnLst>
+  </p:timing>
 </p:sld>
 </file>
 
@@ -5388,6 +8744,13 @@
   <p:clrMapOvr>
     <a:masterClrMapping/>
   </p:clrMapOvr>
+  <p:timing>
+    <p:tnLst>
+      <p:par>
+        <p:cTn id="1" dur="indefinite" restart="never" nodeType="tmRoot"/>
+      </p:par>
+    </p:tnLst>
+  </p:timing>
 </p:sld>
 </file>
 

</xml_diff>